<commit_message>
Modifica schema e immagini device e funzionamento
</commit_message>
<xml_diff>
--- a/Business Plan e Presentazione/Presentazione AIRTLab (BubbleBox).pptx
+++ b/Business Plan e Presentazione/Presentazione AIRTLab (BubbleBox).pptx
@@ -273,7 +273,7 @@
           <a:p>
             <a:fld id="{94B1B409-81A0-4BF7-B761-956A37D2306C}" type="datetimeFigureOut">
               <a:rPr lang="it-IT" smtClean="0"/>
-              <a:t>01/04/2020</a:t>
+              <a:t>20/04/2020</a:t>
             </a:fld>
             <a:endParaRPr lang="it-IT"/>
           </a:p>
@@ -471,7 +471,7 @@
           <a:p>
             <a:fld id="{94B1B409-81A0-4BF7-B761-956A37D2306C}" type="datetimeFigureOut">
               <a:rPr lang="it-IT" smtClean="0"/>
-              <a:t>01/04/2020</a:t>
+              <a:t>20/04/2020</a:t>
             </a:fld>
             <a:endParaRPr lang="it-IT"/>
           </a:p>
@@ -679,7 +679,7 @@
           <a:p>
             <a:fld id="{94B1B409-81A0-4BF7-B761-956A37D2306C}" type="datetimeFigureOut">
               <a:rPr lang="it-IT" smtClean="0"/>
-              <a:t>01/04/2020</a:t>
+              <a:t>20/04/2020</a:t>
             </a:fld>
             <a:endParaRPr lang="it-IT"/>
           </a:p>
@@ -877,7 +877,7 @@
           <a:p>
             <a:fld id="{94B1B409-81A0-4BF7-B761-956A37D2306C}" type="datetimeFigureOut">
               <a:rPr lang="it-IT" smtClean="0"/>
-              <a:t>01/04/2020</a:t>
+              <a:t>20/04/2020</a:t>
             </a:fld>
             <a:endParaRPr lang="it-IT"/>
           </a:p>
@@ -1152,7 +1152,7 @@
           <a:p>
             <a:fld id="{94B1B409-81A0-4BF7-B761-956A37D2306C}" type="datetimeFigureOut">
               <a:rPr lang="it-IT" smtClean="0"/>
-              <a:t>01/04/2020</a:t>
+              <a:t>20/04/2020</a:t>
             </a:fld>
             <a:endParaRPr lang="it-IT"/>
           </a:p>
@@ -1417,7 +1417,7 @@
           <a:p>
             <a:fld id="{94B1B409-81A0-4BF7-B761-956A37D2306C}" type="datetimeFigureOut">
               <a:rPr lang="it-IT" smtClean="0"/>
-              <a:t>01/04/2020</a:t>
+              <a:t>20/04/2020</a:t>
             </a:fld>
             <a:endParaRPr lang="it-IT"/>
           </a:p>
@@ -1829,7 +1829,7 @@
           <a:p>
             <a:fld id="{94B1B409-81A0-4BF7-B761-956A37D2306C}" type="datetimeFigureOut">
               <a:rPr lang="it-IT" smtClean="0"/>
-              <a:t>01/04/2020</a:t>
+              <a:t>20/04/2020</a:t>
             </a:fld>
             <a:endParaRPr lang="it-IT"/>
           </a:p>
@@ -1970,7 +1970,7 @@
           <a:p>
             <a:fld id="{94B1B409-81A0-4BF7-B761-956A37D2306C}" type="datetimeFigureOut">
               <a:rPr lang="it-IT" smtClean="0"/>
-              <a:t>01/04/2020</a:t>
+              <a:t>20/04/2020</a:t>
             </a:fld>
             <a:endParaRPr lang="it-IT"/>
           </a:p>
@@ -2083,7 +2083,7 @@
           <a:p>
             <a:fld id="{94B1B409-81A0-4BF7-B761-956A37D2306C}" type="datetimeFigureOut">
               <a:rPr lang="it-IT" smtClean="0"/>
-              <a:t>01/04/2020</a:t>
+              <a:t>20/04/2020</a:t>
             </a:fld>
             <a:endParaRPr lang="it-IT"/>
           </a:p>
@@ -2394,7 +2394,7 @@
           <a:p>
             <a:fld id="{94B1B409-81A0-4BF7-B761-956A37D2306C}" type="datetimeFigureOut">
               <a:rPr lang="it-IT" smtClean="0"/>
-              <a:t>01/04/2020</a:t>
+              <a:t>20/04/2020</a:t>
             </a:fld>
             <a:endParaRPr lang="it-IT"/>
           </a:p>
@@ -2682,7 +2682,7 @@
           <a:p>
             <a:fld id="{94B1B409-81A0-4BF7-B761-956A37D2306C}" type="datetimeFigureOut">
               <a:rPr lang="it-IT" smtClean="0"/>
-              <a:t>01/04/2020</a:t>
+              <a:t>20/04/2020</a:t>
             </a:fld>
             <a:endParaRPr lang="it-IT"/>
           </a:p>
@@ -2923,7 +2923,7 @@
           <a:p>
             <a:fld id="{94B1B409-81A0-4BF7-B761-956A37D2306C}" type="datetimeFigureOut">
               <a:rPr lang="it-IT" smtClean="0"/>
-              <a:t>01/04/2020</a:t>
+              <a:t>20/04/2020</a:t>
             </a:fld>
             <a:endParaRPr lang="it-IT"/>
           </a:p>
@@ -8205,10 +8205,10 @@
       </p:sp>
       <p:pic>
         <p:nvPicPr>
-          <p:cNvPr id="7" name="Picture 2" descr="Risultato immagini per modulo gsm arduino">
-            <a:extLst>
-              <a:ext uri="{FF2B5EF4-FFF2-40B4-BE49-F238E27FC236}">
-                <a16:creationId xmlns:a16="http://schemas.microsoft.com/office/drawing/2014/main" id="{00FFA036-23A1-42A0-B122-CA106034C702}"/>
+          <p:cNvPr id="1026" name="Picture 2" descr="Risultato immagini per smartphone">
+            <a:extLst>
+              <a:ext uri="{FF2B5EF4-FFF2-40B4-BE49-F238E27FC236}">
+                <a16:creationId xmlns:a16="http://schemas.microsoft.com/office/drawing/2014/main" id="{4EEEC294-BA5C-4EA7-91AA-36C124B25E90}"/>
               </a:ext>
             </a:extLst>
           </p:cNvPr>
@@ -8219,53 +8219,6 @@
         </p:nvPicPr>
         <p:blipFill>
           <a:blip r:embed="rId2">
-            <a:extLst>
-              <a:ext uri="{28A0092B-C50C-407E-A947-70E740481C1C}">
-                <a14:useLocalDpi xmlns:a14="http://schemas.microsoft.com/office/drawing/2010/main" val="0"/>
-              </a:ext>
-            </a:extLst>
-          </a:blip>
-          <a:srcRect/>
-          <a:stretch>
-            <a:fillRect/>
-          </a:stretch>
-        </p:blipFill>
-        <p:spPr bwMode="auto">
-          <a:xfrm>
-            <a:off x="2334062" y="616406"/>
-            <a:ext cx="1137920" cy="1137920"/>
-          </a:xfrm>
-          <a:prstGeom prst="rect">
-            <a:avLst/>
-          </a:prstGeom>
-          <a:noFill/>
-          <a:extLst>
-            <a:ext uri="{909E8E84-426E-40DD-AFC4-6F175D3DCCD1}">
-              <a14:hiddenFill xmlns:a14="http://schemas.microsoft.com/office/drawing/2010/main">
-                <a:solidFill>
-                  <a:srgbClr val="FFFFFF"/>
-                </a:solidFill>
-              </a14:hiddenFill>
-            </a:ext>
-          </a:extLst>
-        </p:spPr>
-      </p:pic>
-      <p:pic>
-        <p:nvPicPr>
-          <p:cNvPr id="1026" name="Picture 2" descr="Risultato immagini per smartphone">
-            <a:extLst>
-              <a:ext uri="{FF2B5EF4-FFF2-40B4-BE49-F238E27FC236}">
-                <a16:creationId xmlns:a16="http://schemas.microsoft.com/office/drawing/2014/main" id="{4EEEC294-BA5C-4EA7-91AA-36C124B25E90}"/>
-              </a:ext>
-            </a:extLst>
-          </p:cNvPr>
-          <p:cNvPicPr>
-            <a:picLocks noChangeAspect="1" noChangeArrowheads="1"/>
-          </p:cNvPicPr>
-          <p:nvPr/>
-        </p:nvPicPr>
-        <p:blipFill>
-          <a:blip r:embed="rId3">
             <a:extLst>
               <a:ext uri="{28A0092B-C50C-407E-A947-70E740481C1C}">
                 <a14:useLocalDpi xmlns:a14="http://schemas.microsoft.com/office/drawing/2010/main" val="0"/>
@@ -8312,13 +8265,13 @@
           <p:nvPr/>
         </p:nvPicPr>
         <p:blipFill>
-          <a:blip r:embed="rId4">
+          <a:blip r:embed="rId3">
             <a:extLst>
               <a:ext uri="{28A0092B-C50C-407E-A947-70E740481C1C}">
                 <a14:useLocalDpi xmlns:a14="http://schemas.microsoft.com/office/drawing/2010/main" val="0"/>
               </a:ext>
               <a:ext uri="{96DAC541-7B7A-43D3-8B79-37D633B846F1}">
-                <asvg:svgBlip xmlns:asvg="http://schemas.microsoft.com/office/drawing/2016/SVG/main" r:embed="rId5"/>
+                <asvg:svgBlip xmlns:asvg="http://schemas.microsoft.com/office/drawing/2016/SVG/main" r:embed="rId4"/>
               </a:ext>
             </a:extLst>
           </a:blip>
@@ -8338,10 +8291,10 @@
       </p:pic>
       <p:pic>
         <p:nvPicPr>
-          <p:cNvPr id="12" name="Picture 2" descr="esp32 scheda di sviluppo wifi + bluetooth ultra-basso consumo ...">
-            <a:extLst>
-              <a:ext uri="{FF2B5EF4-FFF2-40B4-BE49-F238E27FC236}">
-                <a16:creationId xmlns:a16="http://schemas.microsoft.com/office/drawing/2014/main" id="{0A86B503-C140-46CC-B3E7-CB2BEC3BFF47}"/>
+          <p:cNvPr id="13" name="Picture 2" descr="NEW 0.96 inch OLED Display Module IIC interface 0.96&quot; 128X64 oled ...">
+            <a:extLst>
+              <a:ext uri="{FF2B5EF4-FFF2-40B4-BE49-F238E27FC236}">
+                <a16:creationId xmlns:a16="http://schemas.microsoft.com/office/drawing/2014/main" id="{E5ED501D-C48A-4967-B40C-4E9FFE03D169}"/>
               </a:ext>
             </a:extLst>
           </p:cNvPr>
@@ -8351,7 +8304,7 @@
           <p:nvPr/>
         </p:nvPicPr>
         <p:blipFill>
-          <a:blip r:embed="rId6">
+          <a:blip r:embed="rId5">
             <a:extLst>
               <a:ext uri="{28A0092B-C50C-407E-A947-70E740481C1C}">
                 <a14:useLocalDpi xmlns:a14="http://schemas.microsoft.com/office/drawing/2010/main" val="0"/>
@@ -8364,9 +8317,9 @@
           </a:stretch>
         </p:blipFill>
         <p:spPr bwMode="auto">
-          <a:xfrm rot="18707396">
-            <a:off x="1836217" y="404926"/>
-            <a:ext cx="791976" cy="791976"/>
+          <a:xfrm>
+            <a:off x="1449472" y="77698"/>
+            <a:ext cx="627263" cy="627263"/>
           </a:xfrm>
           <a:prstGeom prst="rect">
             <a:avLst/>
@@ -8385,49 +8338,213 @@
       </p:pic>
       <p:pic>
         <p:nvPicPr>
-          <p:cNvPr id="10" name="Picture 4" descr="Risultato immagini per modulo gps arduino">
-            <a:extLst>
-              <a:ext uri="{FF2B5EF4-FFF2-40B4-BE49-F238E27FC236}">
-                <a16:creationId xmlns:a16="http://schemas.microsoft.com/office/drawing/2014/main" id="{320D104B-1AB4-40ED-B4DD-BB1733EB8A9F}"/>
+          <p:cNvPr id="14" name="Immagine 13" descr="Immagine che contiene elettronico, circuito&#10;&#10;Descrizione generata automaticamente">
+            <a:extLst>
+              <a:ext uri="{FF2B5EF4-FFF2-40B4-BE49-F238E27FC236}">
+                <a16:creationId xmlns:a16="http://schemas.microsoft.com/office/drawing/2014/main" id="{A1DEF3B8-CD90-49A5-9274-16CAD419C230}"/>
               </a:ext>
             </a:extLst>
           </p:cNvPr>
           <p:cNvPicPr>
-            <a:picLocks noChangeAspect="1" noChangeArrowheads="1"/>
+            <a:picLocks noChangeAspect="1"/>
+          </p:cNvPicPr>
+          <p:nvPr/>
+        </p:nvPicPr>
+        <p:blipFill rotWithShape="1">
+          <a:blip r:embed="rId6">
+            <a:extLst>
+              <a:ext uri="{28A0092B-C50C-407E-A947-70E740481C1C}">
+                <a14:useLocalDpi xmlns:a14="http://schemas.microsoft.com/office/drawing/2010/main" val="0"/>
+              </a:ext>
+            </a:extLst>
+          </a:blip>
+          <a:srcRect l="49662" t="11612" b="10139"/>
+          <a:stretch/>
+        </p:blipFill>
+        <p:spPr>
+          <a:xfrm>
+            <a:off x="1609587" y="725140"/>
+            <a:ext cx="734665" cy="856507"/>
+          </a:xfrm>
+          <a:prstGeom prst="rect">
+            <a:avLst/>
+          </a:prstGeom>
+        </p:spPr>
+      </p:pic>
+      <p:pic>
+        <p:nvPicPr>
+          <p:cNvPr id="15" name="Immagine 14" descr="Immagine che contiene elettronico, circuito&#10;&#10;Descrizione generata automaticamente">
+            <a:extLst>
+              <a:ext uri="{FF2B5EF4-FFF2-40B4-BE49-F238E27FC236}">
+                <a16:creationId xmlns:a16="http://schemas.microsoft.com/office/drawing/2014/main" id="{7E3CBEBA-2D30-4E9F-B163-C02664AA055C}"/>
+              </a:ext>
+            </a:extLst>
+          </p:cNvPr>
+          <p:cNvPicPr>
+            <a:picLocks noChangeAspect="1"/>
+          </p:cNvPicPr>
+          <p:nvPr/>
+        </p:nvPicPr>
+        <p:blipFill rotWithShape="1">
+          <a:blip r:embed="rId7">
+            <a:extLst>
+              <a:ext uri="{28A0092B-C50C-407E-A947-70E740481C1C}">
+                <a14:useLocalDpi xmlns:a14="http://schemas.microsoft.com/office/drawing/2010/main" val="0"/>
+              </a:ext>
+            </a:extLst>
+          </a:blip>
+          <a:srcRect l="25533" r="28266" b="41659"/>
+          <a:stretch/>
+        </p:blipFill>
+        <p:spPr>
+          <a:xfrm rot="2283387">
+            <a:off x="364428" y="882170"/>
+            <a:ext cx="631944" cy="445943"/>
+          </a:xfrm>
+          <a:prstGeom prst="rect">
+            <a:avLst/>
+          </a:prstGeom>
+        </p:spPr>
+      </p:pic>
+      <p:pic>
+        <p:nvPicPr>
+          <p:cNvPr id="16" name="Immagine 15" descr="Immagine che contiene elettronico, circuito&#10;&#10;Descrizione generata automaticamente">
+            <a:extLst>
+              <a:ext uri="{FF2B5EF4-FFF2-40B4-BE49-F238E27FC236}">
+                <a16:creationId xmlns:a16="http://schemas.microsoft.com/office/drawing/2014/main" id="{BF8E2D6F-7656-4D8A-85C9-CA9540EC330A}"/>
+              </a:ext>
+            </a:extLst>
+          </p:cNvPr>
+          <p:cNvPicPr>
+            <a:picLocks noChangeAspect="1"/>
+          </p:cNvPicPr>
+          <p:nvPr/>
+        </p:nvPicPr>
+        <p:blipFill rotWithShape="1">
+          <a:blip r:embed="rId8">
+            <a:extLst>
+              <a:ext uri="{28A0092B-C50C-407E-A947-70E740481C1C}">
+                <a14:useLocalDpi xmlns:a14="http://schemas.microsoft.com/office/drawing/2010/main" val="0"/>
+              </a:ext>
+            </a:extLst>
+          </a:blip>
+          <a:srcRect l="2428" t="5263" r="30763" b="9142"/>
+          <a:stretch/>
+        </p:blipFill>
+        <p:spPr>
+          <a:xfrm rot="6073340">
+            <a:off x="2285238" y="129202"/>
+            <a:ext cx="734666" cy="577686"/>
+          </a:xfrm>
+          <a:prstGeom prst="rect">
+            <a:avLst/>
+          </a:prstGeom>
+        </p:spPr>
+      </p:pic>
+      <p:pic>
+        <p:nvPicPr>
+          <p:cNvPr id="17" name="Immagine 16" descr="Immagine che contiene elettronico, circuito&#10;&#10;Descrizione generata automaticamente">
+            <a:extLst>
+              <a:ext uri="{FF2B5EF4-FFF2-40B4-BE49-F238E27FC236}">
+                <a16:creationId xmlns:a16="http://schemas.microsoft.com/office/drawing/2014/main" id="{2441A7F8-EA35-4B2D-BEC4-A1CCF4887210}"/>
+              </a:ext>
+            </a:extLst>
+          </p:cNvPr>
+          <p:cNvPicPr>
+            <a:picLocks noChangeAspect="1"/>
           </p:cNvPicPr>
           <p:nvPr/>
         </p:nvPicPr>
         <p:blipFill>
-          <a:blip r:embed="rId7">
+          <a:blip r:embed="rId9">
             <a:extLst>
               <a:ext uri="{28A0092B-C50C-407E-A947-70E740481C1C}">
                 <a14:useLocalDpi xmlns:a14="http://schemas.microsoft.com/office/drawing/2010/main" val="0"/>
               </a:ext>
             </a:extLst>
           </a:blip>
-          <a:srcRect/>
           <a:stretch>
             <a:fillRect/>
           </a:stretch>
         </p:blipFill>
-        <p:spPr bwMode="auto">
-          <a:xfrm>
-            <a:off x="1123781" y="616406"/>
-            <a:ext cx="782003" cy="782003"/>
+        <p:spPr>
+          <a:xfrm rot="2309393">
+            <a:off x="233042" y="67594"/>
+            <a:ext cx="1160782" cy="700902"/>
           </a:xfrm>
           <a:prstGeom prst="rect">
             <a:avLst/>
           </a:prstGeom>
-          <a:noFill/>
-          <a:extLst>
-            <a:ext uri="{909E8E84-426E-40DD-AFC4-6F175D3DCCD1}">
-              <a14:hiddenFill xmlns:a14="http://schemas.microsoft.com/office/drawing/2010/main">
-                <a:solidFill>
-                  <a:srgbClr val="FFFFFF"/>
-                </a:solidFill>
-              </a14:hiddenFill>
-            </a:ext>
-          </a:extLst>
+        </p:spPr>
+      </p:pic>
+      <p:pic>
+        <p:nvPicPr>
+          <p:cNvPr id="18" name="Immagine 17" descr="Immagine che contiene elettronico, circuito&#10;&#10;Descrizione generata automaticamente">
+            <a:extLst>
+              <a:ext uri="{FF2B5EF4-FFF2-40B4-BE49-F238E27FC236}">
+                <a16:creationId xmlns:a16="http://schemas.microsoft.com/office/drawing/2014/main" id="{4A4DC01D-D31F-4700-97AD-2E5BF38F9DDD}"/>
+              </a:ext>
+            </a:extLst>
+          </p:cNvPr>
+          <p:cNvPicPr>
+            <a:picLocks noChangeAspect="1"/>
+          </p:cNvPicPr>
+          <p:nvPr/>
+        </p:nvPicPr>
+        <p:blipFill rotWithShape="1">
+          <a:blip r:embed="rId10">
+            <a:extLst>
+              <a:ext uri="{28A0092B-C50C-407E-A947-70E740481C1C}">
+                <a14:useLocalDpi xmlns:a14="http://schemas.microsoft.com/office/drawing/2010/main" val="0"/>
+              </a:ext>
+            </a:extLst>
+          </a:blip>
+          <a:srcRect t="26036" b="22190"/>
+          <a:stretch/>
+        </p:blipFill>
+        <p:spPr>
+          <a:xfrm>
+            <a:off x="1168338" y="768131"/>
+            <a:ext cx="481995" cy="249552"/>
+          </a:xfrm>
+          <a:prstGeom prst="rect">
+            <a:avLst/>
+          </a:prstGeom>
+        </p:spPr>
+      </p:pic>
+      <p:pic>
+        <p:nvPicPr>
+          <p:cNvPr id="19" name="Immagine 18">
+            <a:extLst>
+              <a:ext uri="{FF2B5EF4-FFF2-40B4-BE49-F238E27FC236}">
+                <a16:creationId xmlns:a16="http://schemas.microsoft.com/office/drawing/2014/main" id="{5A0BC0F9-1BA4-4F39-87F8-80DCFDA96F9C}"/>
+              </a:ext>
+            </a:extLst>
+          </p:cNvPr>
+          <p:cNvPicPr>
+            <a:picLocks noChangeAspect="1"/>
+          </p:cNvPicPr>
+          <p:nvPr/>
+        </p:nvPicPr>
+        <p:blipFill rotWithShape="1">
+          <a:blip r:embed="rId11">
+            <a:extLst>
+              <a:ext uri="{28A0092B-C50C-407E-A947-70E740481C1C}">
+                <a14:useLocalDpi xmlns:a14="http://schemas.microsoft.com/office/drawing/2010/main" val="0"/>
+              </a:ext>
+            </a:extLst>
+          </a:blip>
+          <a:srcRect l="10317" t="17519" r="16637" b="18748"/>
+          <a:stretch/>
+        </p:blipFill>
+        <p:spPr>
+          <a:xfrm>
+            <a:off x="2443920" y="934161"/>
+            <a:ext cx="670320" cy="584846"/>
+          </a:xfrm>
+          <a:prstGeom prst="rect">
+            <a:avLst/>
+          </a:prstGeom>
         </p:spPr>
       </p:pic>
     </p:spTree>
@@ -13986,7 +14103,7 @@
             </a:pPr>
             <a:r>
               <a:rPr lang="it-IT" sz="2000" i="1" dirty="0"/>
-              <a:t>Arduino Nano</a:t>
+              <a:t>ESP32</a:t>
             </a:r>
           </a:p>
           <a:p>
@@ -14129,7 +14246,7 @@
         </p:blipFill>
         <p:spPr bwMode="auto">
           <a:xfrm>
-            <a:off x="3862860" y="5011468"/>
+            <a:off x="3759771" y="5060330"/>
             <a:ext cx="791976" cy="791976"/>
           </a:xfrm>
           <a:prstGeom prst="rect">
@@ -14145,6 +14262,45 @@
               </a14:hiddenFill>
             </a:ext>
           </a:extLst>
+        </p:spPr>
+      </p:pic>
+      <p:pic>
+        <p:nvPicPr>
+          <p:cNvPr id="18" name="Elemento grafico 17" descr="Bluetooth">
+            <a:extLst>
+              <a:ext uri="{FF2B5EF4-FFF2-40B4-BE49-F238E27FC236}">
+                <a16:creationId xmlns:a16="http://schemas.microsoft.com/office/drawing/2014/main" id="{D6ACD280-DE0B-499F-A890-4E83B4326E69}"/>
+              </a:ext>
+            </a:extLst>
+          </p:cNvPr>
+          <p:cNvPicPr>
+            <a:picLocks noChangeAspect="1"/>
+          </p:cNvPicPr>
+          <p:nvPr/>
+        </p:nvPicPr>
+        <p:blipFill>
+          <a:blip r:embed="rId7">
+            <a:extLst>
+              <a:ext uri="{28A0092B-C50C-407E-A947-70E740481C1C}">
+                <a14:useLocalDpi xmlns:a14="http://schemas.microsoft.com/office/drawing/2010/main" val="0"/>
+              </a:ext>
+              <a:ext uri="{96DAC541-7B7A-43D3-8B79-37D633B846F1}">
+                <asvg:svgBlip xmlns:asvg="http://schemas.microsoft.com/office/drawing/2016/SVG/main" r:embed="rId8"/>
+              </a:ext>
+            </a:extLst>
+          </a:blip>
+          <a:stretch>
+            <a:fillRect/>
+          </a:stretch>
+        </p:blipFill>
+        <p:spPr>
+          <a:xfrm>
+            <a:off x="2711054" y="4853965"/>
+            <a:ext cx="791975" cy="791975"/>
+          </a:xfrm>
+          <a:prstGeom prst="rect">
+            <a:avLst/>
+          </a:prstGeom>
         </p:spPr>
       </p:pic>
     </p:spTree>
@@ -14355,6 +14511,41 @@
                                   </p:childTnLst>
                                 </p:cTn>
                               </p:par>
+                              <p:par>
+                                <p:cTn id="20" presetID="10" presetClass="entr" presetSubtype="0" fill="hold" nodeType="withEffect">
+                                  <p:stCondLst>
+                                    <p:cond delay="0"/>
+                                  </p:stCondLst>
+                                  <p:childTnLst>
+                                    <p:set>
+                                      <p:cBhvr>
+                                        <p:cTn id="21" dur="1" fill="hold">
+                                          <p:stCondLst>
+                                            <p:cond delay="0"/>
+                                          </p:stCondLst>
+                                        </p:cTn>
+                                        <p:tgtEl>
+                                          <p:spTgt spid="18"/>
+                                        </p:tgtEl>
+                                        <p:attrNameLst>
+                                          <p:attrName>style.visibility</p:attrName>
+                                        </p:attrNameLst>
+                                      </p:cBhvr>
+                                      <p:to>
+                                        <p:strVal val="visible"/>
+                                      </p:to>
+                                    </p:set>
+                                    <p:animEffect transition="in" filter="fade">
+                                      <p:cBhvr>
+                                        <p:cTn id="22" dur="500"/>
+                                        <p:tgtEl>
+                                          <p:spTgt spid="18"/>
+                                        </p:tgtEl>
+                                      </p:cBhvr>
+                                    </p:animEffect>
+                                  </p:childTnLst>
+                                </p:cTn>
+                              </p:par>
                             </p:childTnLst>
                           </p:cTn>
                         </p:par>
@@ -14362,26 +14553,26 @@
                     </p:cTn>
                   </p:par>
                   <p:par>
-                    <p:cTn id="20" fill="hold">
+                    <p:cTn id="23" fill="hold">
                       <p:stCondLst>
                         <p:cond delay="indefinite"/>
                       </p:stCondLst>
                       <p:childTnLst>
                         <p:par>
-                          <p:cTn id="21" fill="hold">
+                          <p:cTn id="24" fill="hold">
                             <p:stCondLst>
                               <p:cond delay="0"/>
                             </p:stCondLst>
                             <p:childTnLst>
                               <p:par>
-                                <p:cTn id="22" presetID="10" presetClass="entr" presetSubtype="0" fill="hold" grpId="0" nodeType="clickEffect">
+                                <p:cTn id="25" presetID="10" presetClass="entr" presetSubtype="0" fill="hold" grpId="0" nodeType="clickEffect">
                                   <p:stCondLst>
                                     <p:cond delay="0"/>
                                   </p:stCondLst>
                                   <p:childTnLst>
                                     <p:set>
                                       <p:cBhvr>
-                                        <p:cTn id="23" dur="1" fill="hold">
+                                        <p:cTn id="26" dur="1" fill="hold">
                                           <p:stCondLst>
                                             <p:cond delay="0"/>
                                           </p:stCondLst>
@@ -14399,44 +14590,9 @@
                                     </p:set>
                                     <p:animEffect transition="in" filter="fade">
                                       <p:cBhvr>
-                                        <p:cTn id="24" dur="500"/>
+                                        <p:cTn id="27" dur="500"/>
                                         <p:tgtEl>
                                           <p:spTgt spid="6"/>
-                                        </p:tgtEl>
-                                      </p:cBhvr>
-                                    </p:animEffect>
-                                  </p:childTnLst>
-                                </p:cTn>
-                              </p:par>
-                              <p:par>
-                                <p:cTn id="25" presetID="10" presetClass="entr" presetSubtype="0" fill="hold" nodeType="withEffect">
-                                  <p:stCondLst>
-                                    <p:cond delay="0"/>
-                                  </p:stCondLst>
-                                  <p:childTnLst>
-                                    <p:set>
-                                      <p:cBhvr>
-                                        <p:cTn id="26" dur="1" fill="hold">
-                                          <p:stCondLst>
-                                            <p:cond delay="0"/>
-                                          </p:stCondLst>
-                                        </p:cTn>
-                                        <p:tgtEl>
-                                          <p:spTgt spid="8"/>
-                                        </p:tgtEl>
-                                        <p:attrNameLst>
-                                          <p:attrName>style.visibility</p:attrName>
-                                        </p:attrNameLst>
-                                      </p:cBhvr>
-                                      <p:to>
-                                        <p:strVal val="visible"/>
-                                      </p:to>
-                                    </p:set>
-                                    <p:animEffect transition="in" filter="fade">
-                                      <p:cBhvr>
-                                        <p:cTn id="27" dur="500"/>
-                                        <p:tgtEl>
-                                          <p:spTgt spid="8"/>
                                         </p:tgtEl>
                                       </p:cBhvr>
                                     </p:animEffect>
@@ -14457,7 +14613,7 @@
                                           </p:stCondLst>
                                         </p:cTn>
                                         <p:tgtEl>
-                                          <p:spTgt spid="13"/>
+                                          <p:spTgt spid="8"/>
                                         </p:tgtEl>
                                         <p:attrNameLst>
                                           <p:attrName>style.visibility</p:attrName>
@@ -14471,7 +14627,7 @@
                                       <p:cBhvr>
                                         <p:cTn id="30" dur="500"/>
                                         <p:tgtEl>
-                                          <p:spTgt spid="13"/>
+                                          <p:spTgt spid="8"/>
                                         </p:tgtEl>
                                       </p:cBhvr>
                                     </p:animEffect>
@@ -14479,7 +14635,7 @@
                                 </p:cTn>
                               </p:par>
                               <p:par>
-                                <p:cTn id="31" presetID="10" presetClass="entr" presetSubtype="0" fill="hold" grpId="0" nodeType="withEffect">
+                                <p:cTn id="31" presetID="10" presetClass="entr" presetSubtype="0" fill="hold" nodeType="withEffect">
                                   <p:stCondLst>
                                     <p:cond delay="0"/>
                                   </p:stCondLst>
@@ -14492,7 +14648,7 @@
                                           </p:stCondLst>
                                         </p:cTn>
                                         <p:tgtEl>
-                                          <p:spTgt spid="17"/>
+                                          <p:spTgt spid="13"/>
                                         </p:tgtEl>
                                         <p:attrNameLst>
                                           <p:attrName>style.visibility</p:attrName>
@@ -14506,7 +14662,7 @@
                                       <p:cBhvr>
                                         <p:cTn id="33" dur="500"/>
                                         <p:tgtEl>
-                                          <p:spTgt spid="17"/>
+                                          <p:spTgt spid="13"/>
                                         </p:tgtEl>
                                       </p:cBhvr>
                                     </p:animEffect>
@@ -14514,7 +14670,7 @@
                                 </p:cTn>
                               </p:par>
                               <p:par>
-                                <p:cTn id="34" presetID="2" presetClass="entr" presetSubtype="4" fill="hold" grpId="0" nodeType="withEffect">
+                                <p:cTn id="34" presetID="10" presetClass="entr" presetSubtype="0" fill="hold" grpId="0" nodeType="withEffect">
                                   <p:stCondLst>
                                     <p:cond delay="0"/>
                                   </p:stCondLst>
@@ -14522,6 +14678,41 @@
                                     <p:set>
                                       <p:cBhvr>
                                         <p:cTn id="35" dur="1" fill="hold">
+                                          <p:stCondLst>
+                                            <p:cond delay="0"/>
+                                          </p:stCondLst>
+                                        </p:cTn>
+                                        <p:tgtEl>
+                                          <p:spTgt spid="17"/>
+                                        </p:tgtEl>
+                                        <p:attrNameLst>
+                                          <p:attrName>style.visibility</p:attrName>
+                                        </p:attrNameLst>
+                                      </p:cBhvr>
+                                      <p:to>
+                                        <p:strVal val="visible"/>
+                                      </p:to>
+                                    </p:set>
+                                    <p:animEffect transition="in" filter="fade">
+                                      <p:cBhvr>
+                                        <p:cTn id="36" dur="500"/>
+                                        <p:tgtEl>
+                                          <p:spTgt spid="17"/>
+                                        </p:tgtEl>
+                                      </p:cBhvr>
+                                    </p:animEffect>
+                                  </p:childTnLst>
+                                </p:cTn>
+                              </p:par>
+                              <p:par>
+                                <p:cTn id="37" presetID="2" presetClass="entr" presetSubtype="4" fill="hold" grpId="0" nodeType="withEffect">
+                                  <p:stCondLst>
+                                    <p:cond delay="0"/>
+                                  </p:stCondLst>
+                                  <p:childTnLst>
+                                    <p:set>
+                                      <p:cBhvr>
+                                        <p:cTn id="38" dur="1" fill="hold">
                                           <p:stCondLst>
                                             <p:cond delay="0"/>
                                           </p:stCondLst>
@@ -14539,7 +14730,7 @@
                                     </p:set>
                                     <p:anim calcmode="lin" valueType="num">
                                       <p:cBhvr additive="base">
-                                        <p:cTn id="36" dur="500" fill="hold"/>
+                                        <p:cTn id="39" dur="500" fill="hold"/>
                                         <p:tgtEl>
                                           <p:spTgt spid="19"/>
                                         </p:tgtEl>
@@ -14562,7 +14753,7 @@
                                     </p:anim>
                                     <p:anim calcmode="lin" valueType="num">
                                       <p:cBhvr additive="base">
-                                        <p:cTn id="37" dur="500" fill="hold"/>
+                                        <p:cTn id="40" dur="500" fill="hold"/>
                                         <p:tgtEl>
                                           <p:spTgt spid="19"/>
                                         </p:tgtEl>
@@ -14724,100 +14915,6 @@
           </a:p>
         </p:txBody>
       </p:sp>
-      <p:pic>
-        <p:nvPicPr>
-          <p:cNvPr id="2050" name="Picture 2" descr="Risultato immagini per modulo gsm arduino">
-            <a:extLst>
-              <a:ext uri="{FF2B5EF4-FFF2-40B4-BE49-F238E27FC236}">
-                <a16:creationId xmlns:a16="http://schemas.microsoft.com/office/drawing/2014/main" id="{61BA0686-6B12-4EA7-942A-9B55DABF0BF6}"/>
-              </a:ext>
-            </a:extLst>
-          </p:cNvPr>
-          <p:cNvPicPr>
-            <a:picLocks noChangeAspect="1" noChangeArrowheads="1"/>
-          </p:cNvPicPr>
-          <p:nvPr/>
-        </p:nvPicPr>
-        <p:blipFill>
-          <a:blip r:embed="rId2">
-            <a:extLst>
-              <a:ext uri="{28A0092B-C50C-407E-A947-70E740481C1C}">
-                <a14:useLocalDpi xmlns:a14="http://schemas.microsoft.com/office/drawing/2010/main" val="0"/>
-              </a:ext>
-            </a:extLst>
-          </a:blip>
-          <a:srcRect/>
-          <a:stretch>
-            <a:fillRect/>
-          </a:stretch>
-        </p:blipFill>
-        <p:spPr bwMode="auto">
-          <a:xfrm rot="1579032">
-            <a:off x="6670539" y="4050507"/>
-            <a:ext cx="1137920" cy="1137920"/>
-          </a:xfrm>
-          <a:prstGeom prst="rect">
-            <a:avLst/>
-          </a:prstGeom>
-          <a:noFill/>
-          <a:extLst>
-            <a:ext uri="{909E8E84-426E-40DD-AFC4-6F175D3DCCD1}">
-              <a14:hiddenFill xmlns:a14="http://schemas.microsoft.com/office/drawing/2010/main">
-                <a:solidFill>
-                  <a:srgbClr val="FFFFFF"/>
-                </a:solidFill>
-              </a14:hiddenFill>
-            </a:ext>
-          </a:extLst>
-        </p:spPr>
-      </p:pic>
-      <p:pic>
-        <p:nvPicPr>
-          <p:cNvPr id="2052" name="Picture 4" descr="Risultato immagini per modulo gps arduino">
-            <a:extLst>
-              <a:ext uri="{FF2B5EF4-FFF2-40B4-BE49-F238E27FC236}">
-                <a16:creationId xmlns:a16="http://schemas.microsoft.com/office/drawing/2014/main" id="{3584EC69-47AA-4D78-8018-808C13C08FF4}"/>
-              </a:ext>
-            </a:extLst>
-          </p:cNvPr>
-          <p:cNvPicPr>
-            <a:picLocks noChangeAspect="1" noChangeArrowheads="1"/>
-          </p:cNvPicPr>
-          <p:nvPr/>
-        </p:nvPicPr>
-        <p:blipFill>
-          <a:blip r:embed="rId3">
-            <a:extLst>
-              <a:ext uri="{28A0092B-C50C-407E-A947-70E740481C1C}">
-                <a14:useLocalDpi xmlns:a14="http://schemas.microsoft.com/office/drawing/2010/main" val="0"/>
-              </a:ext>
-            </a:extLst>
-          </a:blip>
-          <a:srcRect/>
-          <a:stretch>
-            <a:fillRect/>
-          </a:stretch>
-        </p:blipFill>
-        <p:spPr bwMode="auto">
-          <a:xfrm>
-            <a:off x="5050515" y="4287837"/>
-            <a:ext cx="782003" cy="782003"/>
-          </a:xfrm>
-          <a:prstGeom prst="rect">
-            <a:avLst/>
-          </a:prstGeom>
-          <a:noFill/>
-          <a:extLst>
-            <a:ext uri="{909E8E84-426E-40DD-AFC4-6F175D3DCCD1}">
-              <a14:hiddenFill xmlns:a14="http://schemas.microsoft.com/office/drawing/2010/main">
-                <a:solidFill>
-                  <a:srgbClr val="FFFFFF"/>
-                </a:solidFill>
-              </a14:hiddenFill>
-            </a:ext>
-          </a:extLst>
-        </p:spPr>
-      </p:pic>
       <p:sp>
         <p:nvSpPr>
           <p:cNvPr id="8" name="Cubo 7">
@@ -14832,8 +14929,8 @@
         </p:nvSpPr>
         <p:spPr>
           <a:xfrm>
-            <a:off x="4368800" y="3729254"/>
-            <a:ext cx="3891280" cy="1676692"/>
+            <a:off x="3444280" y="2715227"/>
+            <a:ext cx="6263262" cy="2691266"/>
           </a:xfrm>
           <a:prstGeom prst="cube">
             <a:avLst/>
@@ -14900,76 +14997,6 @@
           </a:p>
         </p:txBody>
       </p:sp>
-      <p:sp>
-        <p:nvSpPr>
-          <p:cNvPr id="12" name="CasellaDiTesto 11">
-            <a:extLst>
-              <a:ext uri="{FF2B5EF4-FFF2-40B4-BE49-F238E27FC236}">
-                <a16:creationId xmlns:a16="http://schemas.microsoft.com/office/drawing/2014/main" id="{9CFC26C1-FB4A-4BEA-A051-D8EA3F795BD4}"/>
-              </a:ext>
-            </a:extLst>
-          </p:cNvPr>
-          <p:cNvSpPr txBox="1"/>
-          <p:nvPr/>
-        </p:nvSpPr>
-        <p:spPr>
-          <a:xfrm>
-            <a:off x="7343871" y="4636275"/>
-            <a:ext cx="1620520" cy="369332"/>
-          </a:xfrm>
-          <a:prstGeom prst="rect">
-            <a:avLst/>
-          </a:prstGeom>
-          <a:noFill/>
-        </p:spPr>
-        <p:txBody>
-          <a:bodyPr wrap="square" rtlCol="0">
-            <a:spAutoFit/>
-          </a:bodyPr>
-          <a:lstStyle/>
-          <a:p>
-            <a:r>
-              <a:rPr lang="it-IT" dirty="0"/>
-              <a:t>Modulo GSM</a:t>
-            </a:r>
-          </a:p>
-        </p:txBody>
-      </p:sp>
-      <p:sp>
-        <p:nvSpPr>
-          <p:cNvPr id="13" name="CasellaDiTesto 12">
-            <a:extLst>
-              <a:ext uri="{FF2B5EF4-FFF2-40B4-BE49-F238E27FC236}">
-                <a16:creationId xmlns:a16="http://schemas.microsoft.com/office/drawing/2014/main" id="{F9614926-FB33-4677-AE26-DDF7FC9DA8F1}"/>
-              </a:ext>
-            </a:extLst>
-          </p:cNvPr>
-          <p:cNvSpPr txBox="1"/>
-          <p:nvPr/>
-        </p:nvSpPr>
-        <p:spPr>
-          <a:xfrm>
-            <a:off x="4561840" y="4287837"/>
-            <a:ext cx="843280" cy="369332"/>
-          </a:xfrm>
-          <a:prstGeom prst="rect">
-            <a:avLst/>
-          </a:prstGeom>
-          <a:noFill/>
-        </p:spPr>
-        <p:txBody>
-          <a:bodyPr wrap="square" rtlCol="0">
-            <a:spAutoFit/>
-          </a:bodyPr>
-          <a:lstStyle/>
-          <a:p>
-            <a:r>
-              <a:rPr lang="it-IT" dirty="0"/>
-              <a:t>GPS</a:t>
-            </a:r>
-          </a:p>
-        </p:txBody>
-      </p:sp>
       <p:cxnSp>
         <p:nvCxnSpPr>
           <p:cNvPr id="15" name="Connettore 2 14">
@@ -14981,7 +15008,6 @@
           </p:cNvPr>
           <p:cNvCxnSpPr>
             <a:cxnSpLocks/>
-            <a:stCxn id="23" idx="2"/>
           </p:cNvCxnSpPr>
           <p:nvPr/>
         </p:nvCxnSpPr>
@@ -15063,8 +15089,8 @@
         </p:nvCxnSpPr>
         <p:spPr>
           <a:xfrm flipV="1">
-            <a:off x="6477266" y="3429000"/>
-            <a:ext cx="136894" cy="856506"/>
+            <a:off x="6477266" y="2702975"/>
+            <a:ext cx="204325" cy="1582531"/>
           </a:xfrm>
           <a:prstGeom prst="straightConnector1">
             <a:avLst/>
@@ -15102,7 +15128,7 @@
         </p:nvSpPr>
         <p:spPr>
           <a:xfrm>
-            <a:off x="6018656" y="2837452"/>
+            <a:off x="6171056" y="2056644"/>
             <a:ext cx="1438784" cy="646331"/>
           </a:xfrm>
           <a:prstGeom prst="rect">
@@ -15123,53 +15149,12 @@
           </a:p>
         </p:txBody>
       </p:sp>
-      <p:cxnSp>
-        <p:nvCxnSpPr>
-          <p:cNvPr id="21" name="Connettore 2 20">
-            <a:extLst>
-              <a:ext uri="{FF2B5EF4-FFF2-40B4-BE49-F238E27FC236}">
-                <a16:creationId xmlns:a16="http://schemas.microsoft.com/office/drawing/2014/main" id="{3A6427F7-75A0-439A-B731-8976D3AA359A}"/>
-              </a:ext>
-            </a:extLst>
-          </p:cNvPr>
-          <p:cNvCxnSpPr>
-            <a:stCxn id="13" idx="2"/>
-          </p:cNvCxnSpPr>
-          <p:nvPr/>
-        </p:nvCxnSpPr>
-        <p:spPr>
-          <a:xfrm flipH="1" flipV="1">
-            <a:off x="4216400" y="4472503"/>
-            <a:ext cx="767080" cy="184666"/>
-          </a:xfrm>
-          <a:prstGeom prst="straightConnector1">
-            <a:avLst/>
-          </a:prstGeom>
-          <a:ln>
-            <a:tailEnd type="triangle"/>
-          </a:ln>
-        </p:spPr>
-        <p:style>
-          <a:lnRef idx="1">
-            <a:schemeClr val="accent1"/>
-          </a:lnRef>
-          <a:fillRef idx="0">
-            <a:schemeClr val="accent1"/>
-          </a:fillRef>
-          <a:effectRef idx="0">
-            <a:schemeClr val="accent1"/>
-          </a:effectRef>
-          <a:fontRef idx="minor">
-            <a:schemeClr val="tx1"/>
-          </a:fontRef>
-        </p:style>
-      </p:cxnSp>
       <p:sp>
         <p:nvSpPr>
-          <p:cNvPr id="22" name="CasellaDiTesto 21">
-            <a:extLst>
-              <a:ext uri="{FF2B5EF4-FFF2-40B4-BE49-F238E27FC236}">
-                <a16:creationId xmlns:a16="http://schemas.microsoft.com/office/drawing/2014/main" id="{AEE6DD3E-7C39-4EF3-B102-48458987A634}"/>
+          <p:cNvPr id="25" name="CasellaDiTesto 24">
+            <a:extLst>
+              <a:ext uri="{FF2B5EF4-FFF2-40B4-BE49-F238E27FC236}">
+                <a16:creationId xmlns:a16="http://schemas.microsoft.com/office/drawing/2014/main" id="{DA9C83CD-4660-4136-8EEB-BBF18054CAF1}"/>
               </a:ext>
             </a:extLst>
           </p:cNvPr>
@@ -15178,81 +15163,7 @@
         </p:nvSpPr>
         <p:spPr>
           <a:xfrm>
-            <a:off x="3069748" y="3584270"/>
-            <a:ext cx="1353715" cy="1477328"/>
-          </a:xfrm>
-          <a:prstGeom prst="rect">
-            <a:avLst/>
-          </a:prstGeom>
-          <a:noFill/>
-        </p:spPr>
-        <p:txBody>
-          <a:bodyPr wrap="square" rtlCol="0">
-            <a:spAutoFit/>
-          </a:bodyPr>
-          <a:lstStyle/>
-          <a:p>
-            <a:r>
-              <a:rPr lang="it-IT" dirty="0"/>
-              <a:t>Elabora coordinate GPS quando si innesca un contatto</a:t>
-            </a:r>
-          </a:p>
-        </p:txBody>
-      </p:sp>
-      <p:cxnSp>
-        <p:nvCxnSpPr>
-          <p:cNvPr id="24" name="Connettore 2 23">
-            <a:extLst>
-              <a:ext uri="{FF2B5EF4-FFF2-40B4-BE49-F238E27FC236}">
-                <a16:creationId xmlns:a16="http://schemas.microsoft.com/office/drawing/2014/main" id="{423673D8-B67C-42D9-9FE4-953E7F027C21}"/>
-              </a:ext>
-            </a:extLst>
-          </p:cNvPr>
-          <p:cNvCxnSpPr/>
-          <p:nvPr/>
-        </p:nvCxnSpPr>
-        <p:spPr>
-          <a:xfrm flipV="1">
-            <a:off x="7564120" y="4109280"/>
-            <a:ext cx="1132840" cy="455556"/>
-          </a:xfrm>
-          <a:prstGeom prst="straightConnector1">
-            <a:avLst/>
-          </a:prstGeom>
-          <a:ln>
-            <a:tailEnd type="triangle"/>
-          </a:ln>
-        </p:spPr>
-        <p:style>
-          <a:lnRef idx="1">
-            <a:schemeClr val="accent1"/>
-          </a:lnRef>
-          <a:fillRef idx="0">
-            <a:schemeClr val="accent1"/>
-          </a:fillRef>
-          <a:effectRef idx="0">
-            <a:schemeClr val="accent1"/>
-          </a:effectRef>
-          <a:fontRef idx="minor">
-            <a:schemeClr val="tx1"/>
-          </a:fontRef>
-        </p:style>
-      </p:cxnSp>
-      <p:sp>
-        <p:nvSpPr>
-          <p:cNvPr id="25" name="CasellaDiTesto 24">
-            <a:extLst>
-              <a:ext uri="{FF2B5EF4-FFF2-40B4-BE49-F238E27FC236}">
-                <a16:creationId xmlns:a16="http://schemas.microsoft.com/office/drawing/2014/main" id="{DA9C83CD-4660-4136-8EEB-BBF18054CAF1}"/>
-              </a:ext>
-            </a:extLst>
-          </p:cNvPr>
-          <p:cNvSpPr txBox="1"/>
-          <p:nvPr/>
-        </p:nvSpPr>
-        <p:spPr>
-          <a:xfrm>
-            <a:off x="8728416" y="3688547"/>
+            <a:off x="10231902" y="3249458"/>
             <a:ext cx="1051636" cy="923330"/>
           </a:xfrm>
           <a:prstGeom prst="rect">
@@ -15282,13 +15193,16 @@
               </a:ext>
             </a:extLst>
           </p:cNvPr>
-          <p:cNvCxnSpPr/>
+          <p:cNvCxnSpPr>
+            <a:cxnSpLocks/>
+            <a:endCxn id="28" idx="1"/>
+          </p:cNvCxnSpPr>
           <p:nvPr/>
         </p:nvCxnSpPr>
         <p:spPr>
           <a:xfrm flipV="1">
-            <a:off x="9519920" y="3078480"/>
-            <a:ext cx="629920" cy="782028"/>
+            <a:off x="10572243" y="2326128"/>
+            <a:ext cx="0" cy="967488"/>
           </a:xfrm>
           <a:prstGeom prst="straightConnector1">
             <a:avLst/>
@@ -15326,7 +15240,7 @@
         </p:nvSpPr>
         <p:spPr>
           <a:xfrm>
-            <a:off x="9254234" y="2072640"/>
+            <a:off x="9519920" y="1403781"/>
             <a:ext cx="2104646" cy="923330"/>
           </a:xfrm>
           <a:prstGeom prst="cloud">
@@ -15359,12 +15273,47 @@
           </a:p>
         </p:txBody>
       </p:sp>
+      <p:sp>
+        <p:nvSpPr>
+          <p:cNvPr id="26" name="CasellaDiTesto 25">
+            <a:extLst>
+              <a:ext uri="{FF2B5EF4-FFF2-40B4-BE49-F238E27FC236}">
+                <a16:creationId xmlns:a16="http://schemas.microsoft.com/office/drawing/2014/main" id="{0A935910-DDC2-4D55-BBA6-15BA1C29BF0E}"/>
+              </a:ext>
+            </a:extLst>
+          </p:cNvPr>
+          <p:cNvSpPr txBox="1"/>
+          <p:nvPr/>
+        </p:nvSpPr>
+        <p:spPr>
+          <a:xfrm>
+            <a:off x="5871331" y="4111000"/>
+            <a:ext cx="1620520" cy="369332"/>
+          </a:xfrm>
+          <a:prstGeom prst="rect">
+            <a:avLst/>
+          </a:prstGeom>
+          <a:noFill/>
+        </p:spPr>
+        <p:txBody>
+          <a:bodyPr wrap="square" rtlCol="0">
+            <a:spAutoFit/>
+          </a:bodyPr>
+          <a:lstStyle/>
+          <a:p>
+            <a:r>
+              <a:rPr lang="it-IT" dirty="0"/>
+              <a:t>ESP-32 Chip</a:t>
+            </a:r>
+          </a:p>
+        </p:txBody>
+      </p:sp>
       <p:pic>
         <p:nvPicPr>
-          <p:cNvPr id="23" name="Picture 2" descr="esp32 scheda di sviluppo wifi + bluetooth ultra-basso consumo ...">
-            <a:extLst>
-              <a:ext uri="{FF2B5EF4-FFF2-40B4-BE49-F238E27FC236}">
-                <a16:creationId xmlns:a16="http://schemas.microsoft.com/office/drawing/2014/main" id="{1A45A812-6EDC-44CF-ADD3-E3A85DB6F232}"/>
+          <p:cNvPr id="1026" name="Picture 2" descr="NEW 0.96 inch OLED Display Module IIC interface 0.96&quot; 128X64 oled ...">
+            <a:extLst>
+              <a:ext uri="{FF2B5EF4-FFF2-40B4-BE49-F238E27FC236}">
+                <a16:creationId xmlns:a16="http://schemas.microsoft.com/office/drawing/2014/main" id="{A736027D-DBC7-4400-B2EF-DF9F807A7B74}"/>
               </a:ext>
             </a:extLst>
           </p:cNvPr>
@@ -15374,7 +15323,7 @@
           <p:nvPr/>
         </p:nvPicPr>
         <p:blipFill>
-          <a:blip r:embed="rId4">
+          <a:blip r:embed="rId2">
             <a:extLst>
               <a:ext uri="{28A0092B-C50C-407E-A947-70E740481C1C}">
                 <a14:useLocalDpi xmlns:a14="http://schemas.microsoft.com/office/drawing/2010/main" val="0"/>
@@ -15388,8 +15337,8 @@
         </p:blipFill>
         <p:spPr bwMode="auto">
           <a:xfrm>
-            <a:off x="5883865" y="4310132"/>
-            <a:ext cx="791976" cy="791976"/>
+            <a:off x="4840089" y="4156540"/>
+            <a:ext cx="627263" cy="627263"/>
           </a:xfrm>
           <a:prstGeom prst="rect">
             <a:avLst/>
@@ -15408,10 +15357,10 @@
       </p:pic>
       <p:sp>
         <p:nvSpPr>
-          <p:cNvPr id="26" name="CasellaDiTesto 25">
-            <a:extLst>
-              <a:ext uri="{FF2B5EF4-FFF2-40B4-BE49-F238E27FC236}">
-                <a16:creationId xmlns:a16="http://schemas.microsoft.com/office/drawing/2014/main" id="{0A935910-DDC2-4D55-BBA6-15BA1C29BF0E}"/>
+          <p:cNvPr id="5" name="CasellaDiTesto 4">
+            <a:extLst>
+              <a:ext uri="{FF2B5EF4-FFF2-40B4-BE49-F238E27FC236}">
+                <a16:creationId xmlns:a16="http://schemas.microsoft.com/office/drawing/2014/main" id="{9C2543CD-F1D5-4CC1-A482-E173DE6FF7C2}"/>
               </a:ext>
             </a:extLst>
           </p:cNvPr>
@@ -15420,8 +15369,8 @@
         </p:nvSpPr>
         <p:spPr>
           <a:xfrm>
-            <a:off x="6000834" y="4100840"/>
-            <a:ext cx="1620520" cy="369332"/>
+            <a:off x="4436108" y="4668819"/>
+            <a:ext cx="1435223" cy="369332"/>
           </a:xfrm>
           <a:prstGeom prst="rect">
             <a:avLst/>
@@ -15436,11 +15385,799 @@
           <a:p>
             <a:r>
               <a:rPr lang="it-IT" dirty="0"/>
-              <a:t>ESP-32</a:t>
+              <a:t>Display 0.96</a:t>
             </a:r>
           </a:p>
         </p:txBody>
       </p:sp>
+      <p:pic>
+        <p:nvPicPr>
+          <p:cNvPr id="7" name="Immagine 6" descr="Immagine che contiene elettronico, circuito&#10;&#10;Descrizione generata automaticamente">
+            <a:extLst>
+              <a:ext uri="{FF2B5EF4-FFF2-40B4-BE49-F238E27FC236}">
+                <a16:creationId xmlns:a16="http://schemas.microsoft.com/office/drawing/2014/main" id="{78331F51-354A-4271-85DF-34712691F112}"/>
+              </a:ext>
+            </a:extLst>
+          </p:cNvPr>
+          <p:cNvPicPr>
+            <a:picLocks noChangeAspect="1"/>
+          </p:cNvPicPr>
+          <p:nvPr/>
+        </p:nvPicPr>
+        <p:blipFill rotWithShape="1">
+          <a:blip r:embed="rId3">
+            <a:extLst>
+              <a:ext uri="{28A0092B-C50C-407E-A947-70E740481C1C}">
+                <a14:useLocalDpi xmlns:a14="http://schemas.microsoft.com/office/drawing/2010/main" val="0"/>
+              </a:ext>
+            </a:extLst>
+          </a:blip>
+          <a:srcRect l="49662" t="11612" b="10139"/>
+          <a:stretch/>
+        </p:blipFill>
+        <p:spPr>
+          <a:xfrm>
+            <a:off x="6037480" y="4391809"/>
+            <a:ext cx="734665" cy="856507"/>
+          </a:xfrm>
+          <a:prstGeom prst="rect">
+            <a:avLst/>
+          </a:prstGeom>
+        </p:spPr>
+      </p:pic>
+      <p:pic>
+        <p:nvPicPr>
+          <p:cNvPr id="11" name="Immagine 10" descr="Immagine che contiene elettronico, circuito&#10;&#10;Descrizione generata automaticamente">
+            <a:extLst>
+              <a:ext uri="{FF2B5EF4-FFF2-40B4-BE49-F238E27FC236}">
+                <a16:creationId xmlns:a16="http://schemas.microsoft.com/office/drawing/2014/main" id="{761F4414-E8FB-4810-8180-B555AC28C268}"/>
+              </a:ext>
+            </a:extLst>
+          </p:cNvPr>
+          <p:cNvPicPr>
+            <a:picLocks noChangeAspect="1"/>
+          </p:cNvPicPr>
+          <p:nvPr/>
+        </p:nvPicPr>
+        <p:blipFill rotWithShape="1">
+          <a:blip r:embed="rId4">
+            <a:extLst>
+              <a:ext uri="{28A0092B-C50C-407E-A947-70E740481C1C}">
+                <a14:useLocalDpi xmlns:a14="http://schemas.microsoft.com/office/drawing/2010/main" val="0"/>
+              </a:ext>
+            </a:extLst>
+          </a:blip>
+          <a:srcRect l="25533" r="28266" b="41659"/>
+          <a:stretch/>
+        </p:blipFill>
+        <p:spPr>
+          <a:xfrm>
+            <a:off x="3607109" y="4783803"/>
+            <a:ext cx="631944" cy="445943"/>
+          </a:xfrm>
+          <a:prstGeom prst="rect">
+            <a:avLst/>
+          </a:prstGeom>
+        </p:spPr>
+      </p:pic>
+      <p:sp>
+        <p:nvSpPr>
+          <p:cNvPr id="14" name="CasellaDiTesto 13">
+            <a:extLst>
+              <a:ext uri="{FF2B5EF4-FFF2-40B4-BE49-F238E27FC236}">
+                <a16:creationId xmlns:a16="http://schemas.microsoft.com/office/drawing/2014/main" id="{43B9C17F-80FE-448C-8596-FDD9FBEF67B6}"/>
+              </a:ext>
+            </a:extLst>
+          </p:cNvPr>
+          <p:cNvSpPr txBox="1"/>
+          <p:nvPr/>
+        </p:nvSpPr>
+        <p:spPr>
+          <a:xfrm>
+            <a:off x="3333156" y="4415462"/>
+            <a:ext cx="1864863" cy="369332"/>
+          </a:xfrm>
+          <a:prstGeom prst="rect">
+            <a:avLst/>
+          </a:prstGeom>
+          <a:noFill/>
+        </p:spPr>
+        <p:txBody>
+          <a:bodyPr wrap="square" rtlCol="0">
+            <a:spAutoFit/>
+          </a:bodyPr>
+          <a:lstStyle/>
+          <a:p>
+            <a:r>
+              <a:rPr lang="it-IT" dirty="0"/>
+              <a:t>RTC DS3231</a:t>
+            </a:r>
+          </a:p>
+        </p:txBody>
+      </p:sp>
+      <p:pic>
+        <p:nvPicPr>
+          <p:cNvPr id="20" name="Immagine 19" descr="Immagine che contiene elettronico, circuito&#10;&#10;Descrizione generata automaticamente">
+            <a:extLst>
+              <a:ext uri="{FF2B5EF4-FFF2-40B4-BE49-F238E27FC236}">
+                <a16:creationId xmlns:a16="http://schemas.microsoft.com/office/drawing/2014/main" id="{2930B733-58B0-4452-9B83-1A0625BC8C7F}"/>
+              </a:ext>
+            </a:extLst>
+          </p:cNvPr>
+          <p:cNvPicPr>
+            <a:picLocks noChangeAspect="1"/>
+          </p:cNvPicPr>
+          <p:nvPr/>
+        </p:nvPicPr>
+        <p:blipFill rotWithShape="1">
+          <a:blip r:embed="rId5">
+            <a:extLst>
+              <a:ext uri="{28A0092B-C50C-407E-A947-70E740481C1C}">
+                <a14:useLocalDpi xmlns:a14="http://schemas.microsoft.com/office/drawing/2010/main" val="0"/>
+              </a:ext>
+            </a:extLst>
+          </a:blip>
+          <a:srcRect l="2428" t="5263" r="30763" b="9142"/>
+          <a:stretch/>
+        </p:blipFill>
+        <p:spPr>
+          <a:xfrm>
+            <a:off x="7525414" y="3778734"/>
+            <a:ext cx="734666" cy="577686"/>
+          </a:xfrm>
+          <a:prstGeom prst="rect">
+            <a:avLst/>
+          </a:prstGeom>
+        </p:spPr>
+      </p:pic>
+      <p:sp>
+        <p:nvSpPr>
+          <p:cNvPr id="29" name="CasellaDiTesto 28">
+            <a:extLst>
+              <a:ext uri="{FF2B5EF4-FFF2-40B4-BE49-F238E27FC236}">
+                <a16:creationId xmlns:a16="http://schemas.microsoft.com/office/drawing/2014/main" id="{72AD71B5-662B-4616-B37F-69CC40B13CE4}"/>
+              </a:ext>
+            </a:extLst>
+          </p:cNvPr>
+          <p:cNvSpPr txBox="1"/>
+          <p:nvPr/>
+        </p:nvSpPr>
+        <p:spPr>
+          <a:xfrm>
+            <a:off x="7091804" y="3461357"/>
+            <a:ext cx="1832838" cy="369332"/>
+          </a:xfrm>
+          <a:prstGeom prst="rect">
+            <a:avLst/>
+          </a:prstGeom>
+          <a:noFill/>
+        </p:spPr>
+        <p:txBody>
+          <a:bodyPr wrap="square" rtlCol="0">
+            <a:spAutoFit/>
+          </a:bodyPr>
+          <a:lstStyle/>
+          <a:p>
+            <a:r>
+              <a:rPr lang="it-IT" dirty="0" err="1"/>
+              <a:t>MicroSD</a:t>
+            </a:r>
+            <a:r>
+              <a:rPr lang="it-IT" dirty="0"/>
+              <a:t> Adapter</a:t>
+            </a:r>
+          </a:p>
+        </p:txBody>
+      </p:sp>
+      <p:pic>
+        <p:nvPicPr>
+          <p:cNvPr id="2048" name="Immagine 2047" descr="Immagine che contiene elettronico, circuito&#10;&#10;Descrizione generata automaticamente">
+            <a:extLst>
+              <a:ext uri="{FF2B5EF4-FFF2-40B4-BE49-F238E27FC236}">
+                <a16:creationId xmlns:a16="http://schemas.microsoft.com/office/drawing/2014/main" id="{54B68833-8716-4DC4-A75B-EBC3FBE4A1DB}"/>
+              </a:ext>
+            </a:extLst>
+          </p:cNvPr>
+          <p:cNvPicPr>
+            <a:picLocks noChangeAspect="1"/>
+          </p:cNvPicPr>
+          <p:nvPr/>
+        </p:nvPicPr>
+        <p:blipFill>
+          <a:blip r:embed="rId6">
+            <a:extLst>
+              <a:ext uri="{28A0092B-C50C-407E-A947-70E740481C1C}">
+                <a14:useLocalDpi xmlns:a14="http://schemas.microsoft.com/office/drawing/2010/main" val="0"/>
+              </a:ext>
+            </a:extLst>
+          </a:blip>
+          <a:stretch>
+            <a:fillRect/>
+          </a:stretch>
+        </p:blipFill>
+        <p:spPr>
+          <a:xfrm>
+            <a:off x="3703222" y="3683133"/>
+            <a:ext cx="1160782" cy="700902"/>
+          </a:xfrm>
+          <a:prstGeom prst="rect">
+            <a:avLst/>
+          </a:prstGeom>
+        </p:spPr>
+      </p:pic>
+      <p:pic>
+        <p:nvPicPr>
+          <p:cNvPr id="2051" name="Immagine 2050" descr="Immagine che contiene elettronico, circuito&#10;&#10;Descrizione generata automaticamente">
+            <a:extLst>
+              <a:ext uri="{FF2B5EF4-FFF2-40B4-BE49-F238E27FC236}">
+                <a16:creationId xmlns:a16="http://schemas.microsoft.com/office/drawing/2014/main" id="{E25BE301-43ED-45D9-9F95-1BAFCAC38412}"/>
+              </a:ext>
+            </a:extLst>
+          </p:cNvPr>
+          <p:cNvPicPr>
+            <a:picLocks noChangeAspect="1"/>
+          </p:cNvPicPr>
+          <p:nvPr/>
+        </p:nvPicPr>
+        <p:blipFill rotWithShape="1">
+          <a:blip r:embed="rId7">
+            <a:extLst>
+              <a:ext uri="{28A0092B-C50C-407E-A947-70E740481C1C}">
+                <a14:useLocalDpi xmlns:a14="http://schemas.microsoft.com/office/drawing/2010/main" val="0"/>
+              </a:ext>
+            </a:extLst>
+          </a:blip>
+          <a:srcRect t="26036" b="22190"/>
+          <a:stretch/>
+        </p:blipFill>
+        <p:spPr>
+          <a:xfrm>
+            <a:off x="4732109" y="3797569"/>
+            <a:ext cx="481995" cy="249552"/>
+          </a:xfrm>
+          <a:prstGeom prst="rect">
+            <a:avLst/>
+          </a:prstGeom>
+        </p:spPr>
+      </p:pic>
+      <p:sp>
+        <p:nvSpPr>
+          <p:cNvPr id="2053" name="CasellaDiTesto 2052">
+            <a:extLst>
+              <a:ext uri="{FF2B5EF4-FFF2-40B4-BE49-F238E27FC236}">
+                <a16:creationId xmlns:a16="http://schemas.microsoft.com/office/drawing/2014/main" id="{EB3D74C4-EF8C-4222-B292-65AABDD4D3F4}"/>
+              </a:ext>
+            </a:extLst>
+          </p:cNvPr>
+          <p:cNvSpPr txBox="1"/>
+          <p:nvPr/>
+        </p:nvSpPr>
+        <p:spPr>
+          <a:xfrm>
+            <a:off x="3566744" y="3442381"/>
+            <a:ext cx="2854960" cy="369332"/>
+          </a:xfrm>
+          <a:prstGeom prst="rect">
+            <a:avLst/>
+          </a:prstGeom>
+          <a:noFill/>
+        </p:spPr>
+        <p:txBody>
+          <a:bodyPr wrap="square" rtlCol="0">
+            <a:spAutoFit/>
+          </a:bodyPr>
+          <a:lstStyle/>
+          <a:p>
+            <a:r>
+              <a:rPr lang="it-IT" dirty="0"/>
+              <a:t>Arduino Micro con NRF24</a:t>
+            </a:r>
+          </a:p>
+        </p:txBody>
+      </p:sp>
+      <p:pic>
+        <p:nvPicPr>
+          <p:cNvPr id="2055" name="Immagine 2054">
+            <a:extLst>
+              <a:ext uri="{FF2B5EF4-FFF2-40B4-BE49-F238E27FC236}">
+                <a16:creationId xmlns:a16="http://schemas.microsoft.com/office/drawing/2014/main" id="{4649CB35-CB0A-489D-A4DF-420BB4EA2724}"/>
+              </a:ext>
+            </a:extLst>
+          </p:cNvPr>
+          <p:cNvPicPr>
+            <a:picLocks noChangeAspect="1"/>
+          </p:cNvPicPr>
+          <p:nvPr/>
+        </p:nvPicPr>
+        <p:blipFill rotWithShape="1">
+          <a:blip r:embed="rId8">
+            <a:extLst>
+              <a:ext uri="{28A0092B-C50C-407E-A947-70E740481C1C}">
+                <a14:useLocalDpi xmlns:a14="http://schemas.microsoft.com/office/drawing/2010/main" val="0"/>
+              </a:ext>
+            </a:extLst>
+          </a:blip>
+          <a:srcRect l="10317" t="17519" r="16637" b="18748"/>
+          <a:stretch/>
+        </p:blipFill>
+        <p:spPr>
+          <a:xfrm>
+            <a:off x="7557587" y="4470171"/>
+            <a:ext cx="670320" cy="584846"/>
+          </a:xfrm>
+          <a:prstGeom prst="rect">
+            <a:avLst/>
+          </a:prstGeom>
+        </p:spPr>
+      </p:pic>
+      <p:sp>
+        <p:nvSpPr>
+          <p:cNvPr id="2056" name="CasellaDiTesto 2055">
+            <a:extLst>
+              <a:ext uri="{FF2B5EF4-FFF2-40B4-BE49-F238E27FC236}">
+                <a16:creationId xmlns:a16="http://schemas.microsoft.com/office/drawing/2014/main" id="{65C0C2B0-BB5E-4573-81C6-07519114CBD1}"/>
+              </a:ext>
+            </a:extLst>
+          </p:cNvPr>
+          <p:cNvSpPr txBox="1"/>
+          <p:nvPr/>
+        </p:nvSpPr>
+        <p:spPr>
+          <a:xfrm>
+            <a:off x="7091804" y="4992651"/>
+            <a:ext cx="2099566" cy="369332"/>
+          </a:xfrm>
+          <a:prstGeom prst="rect">
+            <a:avLst/>
+          </a:prstGeom>
+          <a:noFill/>
+        </p:spPr>
+        <p:txBody>
+          <a:bodyPr wrap="square" rtlCol="0">
+            <a:spAutoFit/>
+          </a:bodyPr>
+          <a:lstStyle/>
+          <a:p>
+            <a:r>
+              <a:rPr lang="it-IT" dirty="0" err="1"/>
+              <a:t>Recharge</a:t>
+            </a:r>
+            <a:r>
+              <a:rPr lang="it-IT" dirty="0"/>
+              <a:t> </a:t>
+            </a:r>
+            <a:r>
+              <a:rPr lang="it-IT" dirty="0" err="1"/>
+              <a:t>Battery</a:t>
+            </a:r>
+            <a:endParaRPr lang="it-IT" dirty="0"/>
+          </a:p>
+        </p:txBody>
+      </p:sp>
+      <p:cxnSp>
+        <p:nvCxnSpPr>
+          <p:cNvPr id="2058" name="Connettore 2 2057">
+            <a:extLst>
+              <a:ext uri="{FF2B5EF4-FFF2-40B4-BE49-F238E27FC236}">
+                <a16:creationId xmlns:a16="http://schemas.microsoft.com/office/drawing/2014/main" id="{431A7C9D-FAD0-40BF-B8DB-5D51992912E2}"/>
+              </a:ext>
+            </a:extLst>
+          </p:cNvPr>
+          <p:cNvCxnSpPr/>
+          <p:nvPr/>
+        </p:nvCxnSpPr>
+        <p:spPr>
+          <a:xfrm flipH="1" flipV="1">
+            <a:off x="2965751" y="2885440"/>
+            <a:ext cx="957330" cy="797693"/>
+          </a:xfrm>
+          <a:prstGeom prst="straightConnector1">
+            <a:avLst/>
+          </a:prstGeom>
+          <a:ln>
+            <a:tailEnd type="triangle"/>
+          </a:ln>
+        </p:spPr>
+        <p:style>
+          <a:lnRef idx="1">
+            <a:schemeClr val="accent1"/>
+          </a:lnRef>
+          <a:fillRef idx="0">
+            <a:schemeClr val="accent1"/>
+          </a:fillRef>
+          <a:effectRef idx="0">
+            <a:schemeClr val="accent1"/>
+          </a:effectRef>
+          <a:fontRef idx="minor">
+            <a:schemeClr val="tx1"/>
+          </a:fontRef>
+        </p:style>
+      </p:cxnSp>
+      <p:sp>
+        <p:nvSpPr>
+          <p:cNvPr id="2059" name="CasellaDiTesto 2058">
+            <a:extLst>
+              <a:ext uri="{FF2B5EF4-FFF2-40B4-BE49-F238E27FC236}">
+                <a16:creationId xmlns:a16="http://schemas.microsoft.com/office/drawing/2014/main" id="{64547AA0-24E1-4F7A-8144-3DE3B9A0B240}"/>
+              </a:ext>
+            </a:extLst>
+          </p:cNvPr>
+          <p:cNvSpPr txBox="1"/>
+          <p:nvPr/>
+        </p:nvSpPr>
+        <p:spPr>
+          <a:xfrm>
+            <a:off x="1456629" y="1889548"/>
+            <a:ext cx="2082330" cy="1754326"/>
+          </a:xfrm>
+          <a:prstGeom prst="rect">
+            <a:avLst/>
+          </a:prstGeom>
+          <a:noFill/>
+        </p:spPr>
+        <p:txBody>
+          <a:bodyPr wrap="square" rtlCol="0">
+            <a:spAutoFit/>
+          </a:bodyPr>
+          <a:lstStyle/>
+          <a:p>
+            <a:r>
+              <a:rPr lang="it-IT" dirty="0"/>
+              <a:t>Scandaglia l’area alla ricerca di altri device, se ne trova, </a:t>
+            </a:r>
+            <a:r>
+              <a:rPr lang="it-IT" dirty="0" err="1"/>
+              <a:t>sveglua</a:t>
+            </a:r>
+            <a:r>
+              <a:rPr lang="it-IT" dirty="0"/>
+              <a:t> ESP32 (Risparmio energetico)</a:t>
+            </a:r>
+          </a:p>
+        </p:txBody>
+      </p:sp>
+      <p:cxnSp>
+        <p:nvCxnSpPr>
+          <p:cNvPr id="2061" name="Connettore 2 2060">
+            <a:extLst>
+              <a:ext uri="{FF2B5EF4-FFF2-40B4-BE49-F238E27FC236}">
+                <a16:creationId xmlns:a16="http://schemas.microsoft.com/office/drawing/2014/main" id="{F047215B-F0C5-43D7-B952-E9CB0037D4C7}"/>
+              </a:ext>
+            </a:extLst>
+          </p:cNvPr>
+          <p:cNvCxnSpPr/>
+          <p:nvPr/>
+        </p:nvCxnSpPr>
+        <p:spPr>
+          <a:xfrm flipH="1">
+            <a:off x="3149600" y="5248316"/>
+            <a:ext cx="553622" cy="547282"/>
+          </a:xfrm>
+          <a:prstGeom prst="straightConnector1">
+            <a:avLst/>
+          </a:prstGeom>
+          <a:ln>
+            <a:tailEnd type="triangle"/>
+          </a:ln>
+        </p:spPr>
+        <p:style>
+          <a:lnRef idx="1">
+            <a:schemeClr val="accent1"/>
+          </a:lnRef>
+          <a:fillRef idx="0">
+            <a:schemeClr val="accent1"/>
+          </a:fillRef>
+          <a:effectRef idx="0">
+            <a:schemeClr val="accent1"/>
+          </a:effectRef>
+          <a:fontRef idx="minor">
+            <a:schemeClr val="tx1"/>
+          </a:fontRef>
+        </p:style>
+      </p:cxnSp>
+      <p:sp>
+        <p:nvSpPr>
+          <p:cNvPr id="2062" name="CasellaDiTesto 2061">
+            <a:extLst>
+              <a:ext uri="{FF2B5EF4-FFF2-40B4-BE49-F238E27FC236}">
+                <a16:creationId xmlns:a16="http://schemas.microsoft.com/office/drawing/2014/main" id="{9763415E-5F9A-4908-B18F-FF65825226D2}"/>
+              </a:ext>
+            </a:extLst>
+          </p:cNvPr>
+          <p:cNvSpPr txBox="1"/>
+          <p:nvPr/>
+        </p:nvSpPr>
+        <p:spPr>
+          <a:xfrm>
+            <a:off x="1941572" y="5727419"/>
+            <a:ext cx="2640588" cy="646331"/>
+          </a:xfrm>
+          <a:prstGeom prst="rect">
+            <a:avLst/>
+          </a:prstGeom>
+          <a:noFill/>
+        </p:spPr>
+        <p:txBody>
+          <a:bodyPr wrap="square" rtlCol="0">
+            <a:spAutoFit/>
+          </a:bodyPr>
+          <a:lstStyle/>
+          <a:p>
+            <a:r>
+              <a:rPr lang="it-IT" dirty="0"/>
+              <a:t>Mantiene il conteggio della data e ora</a:t>
+            </a:r>
+          </a:p>
+        </p:txBody>
+      </p:sp>
+      <p:cxnSp>
+        <p:nvCxnSpPr>
+          <p:cNvPr id="2064" name="Connettore 2 2063">
+            <a:extLst>
+              <a:ext uri="{FF2B5EF4-FFF2-40B4-BE49-F238E27FC236}">
+                <a16:creationId xmlns:a16="http://schemas.microsoft.com/office/drawing/2014/main" id="{D84EA83A-191E-4367-A570-C01850AB504C}"/>
+              </a:ext>
+            </a:extLst>
+          </p:cNvPr>
+          <p:cNvCxnSpPr/>
+          <p:nvPr/>
+        </p:nvCxnSpPr>
+        <p:spPr>
+          <a:xfrm>
+            <a:off x="8270602" y="5006774"/>
+            <a:ext cx="1005478" cy="649118"/>
+          </a:xfrm>
+          <a:prstGeom prst="straightConnector1">
+            <a:avLst/>
+          </a:prstGeom>
+          <a:ln>
+            <a:tailEnd type="triangle"/>
+          </a:ln>
+        </p:spPr>
+        <p:style>
+          <a:lnRef idx="1">
+            <a:schemeClr val="accent1"/>
+          </a:lnRef>
+          <a:fillRef idx="0">
+            <a:schemeClr val="accent1"/>
+          </a:fillRef>
+          <a:effectRef idx="0">
+            <a:schemeClr val="accent1"/>
+          </a:effectRef>
+          <a:fontRef idx="minor">
+            <a:schemeClr val="tx1"/>
+          </a:fontRef>
+        </p:style>
+      </p:cxnSp>
+      <p:sp>
+        <p:nvSpPr>
+          <p:cNvPr id="2065" name="CasellaDiTesto 2064">
+            <a:extLst>
+              <a:ext uri="{FF2B5EF4-FFF2-40B4-BE49-F238E27FC236}">
+                <a16:creationId xmlns:a16="http://schemas.microsoft.com/office/drawing/2014/main" id="{6EF56F18-2FA9-4AF9-A367-1AA552473F91}"/>
+              </a:ext>
+            </a:extLst>
+          </p:cNvPr>
+          <p:cNvSpPr txBox="1"/>
+          <p:nvPr/>
+        </p:nvSpPr>
+        <p:spPr>
+          <a:xfrm>
+            <a:off x="9276080" y="5534729"/>
+            <a:ext cx="1535312" cy="923330"/>
+          </a:xfrm>
+          <a:prstGeom prst="rect">
+            <a:avLst/>
+          </a:prstGeom>
+          <a:noFill/>
+        </p:spPr>
+        <p:txBody>
+          <a:bodyPr wrap="square" rtlCol="0">
+            <a:spAutoFit/>
+          </a:bodyPr>
+          <a:lstStyle/>
+          <a:p>
+            <a:r>
+              <a:rPr lang="it-IT" dirty="0"/>
+              <a:t>Ricarica la batteria di alimentazione</a:t>
+            </a:r>
+          </a:p>
+        </p:txBody>
+      </p:sp>
+      <p:cxnSp>
+        <p:nvCxnSpPr>
+          <p:cNvPr id="2067" name="Connettore 2 2066">
+            <a:extLst>
+              <a:ext uri="{FF2B5EF4-FFF2-40B4-BE49-F238E27FC236}">
+                <a16:creationId xmlns:a16="http://schemas.microsoft.com/office/drawing/2014/main" id="{77DB4A8A-2F68-4072-91FC-8AD6814DEBE9}"/>
+              </a:ext>
+            </a:extLst>
+          </p:cNvPr>
+          <p:cNvCxnSpPr>
+            <a:cxnSpLocks/>
+          </p:cNvCxnSpPr>
+          <p:nvPr/>
+        </p:nvCxnSpPr>
+        <p:spPr>
+          <a:xfrm flipV="1">
+            <a:off x="7988851" y="2489200"/>
+            <a:ext cx="281751" cy="1217211"/>
+          </a:xfrm>
+          <a:prstGeom prst="straightConnector1">
+            <a:avLst/>
+          </a:prstGeom>
+          <a:ln>
+            <a:tailEnd type="triangle"/>
+          </a:ln>
+        </p:spPr>
+        <p:style>
+          <a:lnRef idx="1">
+            <a:schemeClr val="accent1"/>
+          </a:lnRef>
+          <a:fillRef idx="0">
+            <a:schemeClr val="accent1"/>
+          </a:fillRef>
+          <a:effectRef idx="0">
+            <a:schemeClr val="accent1"/>
+          </a:effectRef>
+          <a:fontRef idx="minor">
+            <a:schemeClr val="tx1"/>
+          </a:fontRef>
+        </p:style>
+      </p:cxnSp>
+      <p:sp>
+        <p:nvSpPr>
+          <p:cNvPr id="2069" name="CasellaDiTesto 2068">
+            <a:extLst>
+              <a:ext uri="{FF2B5EF4-FFF2-40B4-BE49-F238E27FC236}">
+                <a16:creationId xmlns:a16="http://schemas.microsoft.com/office/drawing/2014/main" id="{66252131-3D47-437F-927B-8390D93E2206}"/>
+              </a:ext>
+            </a:extLst>
+          </p:cNvPr>
+          <p:cNvSpPr txBox="1"/>
+          <p:nvPr/>
+        </p:nvSpPr>
+        <p:spPr>
+          <a:xfrm>
+            <a:off x="7596250" y="1910207"/>
+            <a:ext cx="1983568" cy="646331"/>
+          </a:xfrm>
+          <a:prstGeom prst="rect">
+            <a:avLst/>
+          </a:prstGeom>
+          <a:noFill/>
+        </p:spPr>
+        <p:txBody>
+          <a:bodyPr wrap="square" rtlCol="0">
+            <a:spAutoFit/>
+          </a:bodyPr>
+          <a:lstStyle/>
+          <a:p>
+            <a:r>
+              <a:rPr lang="it-IT" dirty="0"/>
+              <a:t>Memoria di massa del device</a:t>
+            </a:r>
+          </a:p>
+        </p:txBody>
+      </p:sp>
+      <p:cxnSp>
+        <p:nvCxnSpPr>
+          <p:cNvPr id="2071" name="Connettore 2 2070">
+            <a:extLst>
+              <a:ext uri="{FF2B5EF4-FFF2-40B4-BE49-F238E27FC236}">
+                <a16:creationId xmlns:a16="http://schemas.microsoft.com/office/drawing/2014/main" id="{9194CE24-5669-44DB-9BBE-993D60AF8956}"/>
+              </a:ext>
+            </a:extLst>
+          </p:cNvPr>
+          <p:cNvCxnSpPr/>
+          <p:nvPr/>
+        </p:nvCxnSpPr>
+        <p:spPr>
+          <a:xfrm>
+            <a:off x="6681591" y="4470171"/>
+            <a:ext cx="2594489" cy="0"/>
+          </a:xfrm>
+          <a:prstGeom prst="straightConnector1">
+            <a:avLst/>
+          </a:prstGeom>
+          <a:ln>
+            <a:tailEnd type="triangle"/>
+          </a:ln>
+        </p:spPr>
+        <p:style>
+          <a:lnRef idx="1">
+            <a:schemeClr val="accent1"/>
+          </a:lnRef>
+          <a:fillRef idx="0">
+            <a:schemeClr val="accent1"/>
+          </a:fillRef>
+          <a:effectRef idx="0">
+            <a:schemeClr val="accent1"/>
+          </a:effectRef>
+          <a:fontRef idx="minor">
+            <a:schemeClr val="tx1"/>
+          </a:fontRef>
+        </p:style>
+      </p:cxnSp>
+      <p:sp>
+        <p:nvSpPr>
+          <p:cNvPr id="2072" name="CasellaDiTesto 2071">
+            <a:extLst>
+              <a:ext uri="{FF2B5EF4-FFF2-40B4-BE49-F238E27FC236}">
+                <a16:creationId xmlns:a16="http://schemas.microsoft.com/office/drawing/2014/main" id="{5D5B1D22-5D5B-4B3E-8353-14C468C7CDC2}"/>
+              </a:ext>
+            </a:extLst>
+          </p:cNvPr>
+          <p:cNvSpPr txBox="1"/>
+          <p:nvPr/>
+        </p:nvSpPr>
+        <p:spPr>
+          <a:xfrm>
+            <a:off x="9251957" y="4094064"/>
+            <a:ext cx="1827271" cy="923330"/>
+          </a:xfrm>
+          <a:prstGeom prst="rect">
+            <a:avLst/>
+          </a:prstGeom>
+          <a:noFill/>
+        </p:spPr>
+        <p:txBody>
+          <a:bodyPr wrap="square" rtlCol="0">
+            <a:spAutoFit/>
+          </a:bodyPr>
+          <a:lstStyle/>
+          <a:p>
+            <a:r>
+              <a:rPr lang="it-IT" dirty="0"/>
+              <a:t>Si connette ad uno smartphone o alla WIFI</a:t>
+            </a:r>
+          </a:p>
+        </p:txBody>
+      </p:sp>
+      <p:cxnSp>
+        <p:nvCxnSpPr>
+          <p:cNvPr id="2074" name="Connettore curvo 2073">
+            <a:extLst>
+              <a:ext uri="{FF2B5EF4-FFF2-40B4-BE49-F238E27FC236}">
+                <a16:creationId xmlns:a16="http://schemas.microsoft.com/office/drawing/2014/main" id="{E1126978-69F5-464C-81E2-38230B13A1A6}"/>
+              </a:ext>
+            </a:extLst>
+          </p:cNvPr>
+          <p:cNvCxnSpPr>
+            <a:stCxn id="2072" idx="3"/>
+            <a:endCxn id="25" idx="3"/>
+          </p:cNvCxnSpPr>
+          <p:nvPr/>
+        </p:nvCxnSpPr>
+        <p:spPr>
+          <a:xfrm flipV="1">
+            <a:off x="11079228" y="3711123"/>
+            <a:ext cx="204310" cy="844606"/>
+          </a:xfrm>
+          <a:prstGeom prst="curvedConnector3">
+            <a:avLst>
+              <a:gd name="adj1" fmla="val 211889"/>
+            </a:avLst>
+          </a:prstGeom>
+          <a:ln>
+            <a:tailEnd type="triangle"/>
+          </a:ln>
+        </p:spPr>
+        <p:style>
+          <a:lnRef idx="1">
+            <a:schemeClr val="accent1"/>
+          </a:lnRef>
+          <a:fillRef idx="0">
+            <a:schemeClr val="accent1"/>
+          </a:fillRef>
+          <a:effectRef idx="0">
+            <a:schemeClr val="accent1"/>
+          </a:effectRef>
+          <a:fontRef idx="minor">
+            <a:schemeClr val="tx1"/>
+          </a:fontRef>
+        </p:style>
+      </p:cxnSp>
     </p:spTree>
     <p:extLst>
       <p:ext uri="{BB962C8B-B14F-4D97-AF65-F5344CB8AC3E}">
@@ -15573,7 +16310,7 @@
                                           </p:stCondLst>
                                         </p:cTn>
                                         <p:tgtEl>
-                                          <p:spTgt spid="23"/>
+                                          <p:spTgt spid="7"/>
                                         </p:tgtEl>
                                         <p:attrNameLst>
                                           <p:attrName>style.visibility</p:attrName>
@@ -15587,7 +16324,7 @@
                                       <p:cBhvr>
                                         <p:cTn id="15" dur="500"/>
                                         <p:tgtEl>
-                                          <p:spTgt spid="23"/>
+                                          <p:spTgt spid="7"/>
                                         </p:tgtEl>
                                       </p:cBhvr>
                                     </p:animEffect>
@@ -15648,7 +16385,7 @@
                             </p:stCondLst>
                             <p:childTnLst>
                               <p:par>
-                                <p:cTn id="21" presetID="2" presetClass="entr" presetSubtype="4" fill="hold" grpId="0" nodeType="clickEffect">
+                                <p:cTn id="21" presetID="10" presetClass="entr" presetSubtype="0" fill="hold" nodeType="clickEffect">
                                   <p:stCondLst>
                                     <p:cond delay="0"/>
                                   </p:stCondLst>
@@ -15661,7 +16398,7 @@
                                           </p:stCondLst>
                                         </p:cTn>
                                         <p:tgtEl>
-                                          <p:spTgt spid="12"/>
+                                          <p:spTgt spid="1026"/>
                                         </p:tgtEl>
                                         <p:attrNameLst>
                                           <p:attrName>style.visibility</p:attrName>
@@ -15671,70 +16408,32 @@
                                         <p:strVal val="visible"/>
                                       </p:to>
                                     </p:set>
-                                    <p:anim calcmode="lin" valueType="num">
-                                      <p:cBhvr additive="base">
-                                        <p:cTn id="23" dur="500" fill="hold"/>
-                                        <p:tgtEl>
-                                          <p:spTgt spid="12"/>
-                                        </p:tgtEl>
-                                        <p:attrNameLst>
-                                          <p:attrName>ppt_x</p:attrName>
-                                        </p:attrNameLst>
-                                      </p:cBhvr>
-                                      <p:tavLst>
-                                        <p:tav tm="0">
-                                          <p:val>
-                                            <p:strVal val="#ppt_x"/>
-                                          </p:val>
-                                        </p:tav>
-                                        <p:tav tm="100000">
-                                          <p:val>
-                                            <p:strVal val="#ppt_x"/>
-                                          </p:val>
-                                        </p:tav>
-                                      </p:tavLst>
-                                    </p:anim>
-                                    <p:anim calcmode="lin" valueType="num">
-                                      <p:cBhvr additive="base">
-                                        <p:cTn id="24" dur="500" fill="hold"/>
-                                        <p:tgtEl>
-                                          <p:spTgt spid="12"/>
-                                        </p:tgtEl>
-                                        <p:attrNameLst>
-                                          <p:attrName>ppt_y</p:attrName>
-                                        </p:attrNameLst>
-                                      </p:cBhvr>
-                                      <p:tavLst>
-                                        <p:tav tm="0">
-                                          <p:val>
-                                            <p:strVal val="1+#ppt_h/2"/>
-                                          </p:val>
-                                        </p:tav>
-                                        <p:tav tm="100000">
-                                          <p:val>
-                                            <p:strVal val="#ppt_y"/>
-                                          </p:val>
-                                        </p:tav>
-                                      </p:tavLst>
-                                    </p:anim>
+                                    <p:animEffect transition="in" filter="fade">
+                                      <p:cBhvr>
+                                        <p:cTn id="23" dur="500"/>
+                                        <p:tgtEl>
+                                          <p:spTgt spid="1026"/>
+                                        </p:tgtEl>
+                                      </p:cBhvr>
+                                    </p:animEffect>
                                   </p:childTnLst>
                                 </p:cTn>
                               </p:par>
                               <p:par>
-                                <p:cTn id="25" presetID="2" presetClass="entr" presetSubtype="4" fill="hold" nodeType="withEffect">
+                                <p:cTn id="24" presetID="10" presetClass="entr" presetSubtype="0" fill="hold" grpId="0" nodeType="withEffect">
                                   <p:stCondLst>
                                     <p:cond delay="0"/>
                                   </p:stCondLst>
                                   <p:childTnLst>
                                     <p:set>
                                       <p:cBhvr>
-                                        <p:cTn id="26" dur="1" fill="hold">
+                                        <p:cTn id="25" dur="1" fill="hold">
                                           <p:stCondLst>
                                             <p:cond delay="0"/>
                                           </p:stCondLst>
                                         </p:cTn>
                                         <p:tgtEl>
-                                          <p:spTgt spid="2050"/>
+                                          <p:spTgt spid="5"/>
                                         </p:tgtEl>
                                         <p:attrNameLst>
                                           <p:attrName>style.visibility</p:attrName>
@@ -15744,52 +16443,14 @@
                                         <p:strVal val="visible"/>
                                       </p:to>
                                     </p:set>
-                                    <p:anim calcmode="lin" valueType="num">
-                                      <p:cBhvr additive="base">
-                                        <p:cTn id="27" dur="500" fill="hold"/>
-                                        <p:tgtEl>
-                                          <p:spTgt spid="2050"/>
-                                        </p:tgtEl>
-                                        <p:attrNameLst>
-                                          <p:attrName>ppt_x</p:attrName>
-                                        </p:attrNameLst>
-                                      </p:cBhvr>
-                                      <p:tavLst>
-                                        <p:tav tm="0">
-                                          <p:val>
-                                            <p:strVal val="#ppt_x"/>
-                                          </p:val>
-                                        </p:tav>
-                                        <p:tav tm="100000">
-                                          <p:val>
-                                            <p:strVal val="#ppt_x"/>
-                                          </p:val>
-                                        </p:tav>
-                                      </p:tavLst>
-                                    </p:anim>
-                                    <p:anim calcmode="lin" valueType="num">
-                                      <p:cBhvr additive="base">
-                                        <p:cTn id="28" dur="500" fill="hold"/>
-                                        <p:tgtEl>
-                                          <p:spTgt spid="2050"/>
-                                        </p:tgtEl>
-                                        <p:attrNameLst>
-                                          <p:attrName>ppt_y</p:attrName>
-                                        </p:attrNameLst>
-                                      </p:cBhvr>
-                                      <p:tavLst>
-                                        <p:tav tm="0">
-                                          <p:val>
-                                            <p:strVal val="1+#ppt_h/2"/>
-                                          </p:val>
-                                        </p:tav>
-                                        <p:tav tm="100000">
-                                          <p:val>
-                                            <p:strVal val="#ppt_y"/>
-                                          </p:val>
-                                        </p:tav>
-                                      </p:tavLst>
-                                    </p:anim>
+                                    <p:animEffect transition="in" filter="fade">
+                                      <p:cBhvr>
+                                        <p:cTn id="26" dur="500"/>
+                                        <p:tgtEl>
+                                          <p:spTgt spid="5"/>
+                                        </p:tgtEl>
+                                      </p:cBhvr>
+                                    </p:animEffect>
                                   </p:childTnLst>
                                 </p:cTn>
                               </p:par>
@@ -15800,32 +16461,32 @@
                     </p:cTn>
                   </p:par>
                   <p:par>
-                    <p:cTn id="29" fill="hold">
+                    <p:cTn id="27" fill="hold">
                       <p:stCondLst>
                         <p:cond delay="indefinite"/>
                       </p:stCondLst>
                       <p:childTnLst>
                         <p:par>
-                          <p:cTn id="30" fill="hold">
+                          <p:cTn id="28" fill="hold">
                             <p:stCondLst>
                               <p:cond delay="0"/>
                             </p:stCondLst>
                             <p:childTnLst>
                               <p:par>
-                                <p:cTn id="31" presetID="2" presetClass="entr" presetSubtype="4" fill="hold" nodeType="clickEffect">
+                                <p:cTn id="29" presetID="10" presetClass="entr" presetSubtype="0" fill="hold" nodeType="clickEffect">
                                   <p:stCondLst>
                                     <p:cond delay="0"/>
                                   </p:stCondLst>
                                   <p:childTnLst>
                                     <p:set>
                                       <p:cBhvr>
-                                        <p:cTn id="32" dur="1" fill="hold">
+                                        <p:cTn id="30" dur="1" fill="hold">
                                           <p:stCondLst>
                                             <p:cond delay="0"/>
                                           </p:stCondLst>
                                         </p:cTn>
                                         <p:tgtEl>
-                                          <p:spTgt spid="2052"/>
+                                          <p:spTgt spid="2048"/>
                                         </p:tgtEl>
                                         <p:attrNameLst>
                                           <p:attrName>style.visibility</p:attrName>
@@ -15835,70 +16496,67 @@
                                         <p:strVal val="visible"/>
                                       </p:to>
                                     </p:set>
-                                    <p:anim calcmode="lin" valueType="num">
-                                      <p:cBhvr additive="base">
-                                        <p:cTn id="33" dur="500" fill="hold"/>
-                                        <p:tgtEl>
-                                          <p:spTgt spid="2052"/>
-                                        </p:tgtEl>
-                                        <p:attrNameLst>
-                                          <p:attrName>ppt_x</p:attrName>
-                                        </p:attrNameLst>
-                                      </p:cBhvr>
-                                      <p:tavLst>
-                                        <p:tav tm="0">
-                                          <p:val>
-                                            <p:strVal val="#ppt_x"/>
-                                          </p:val>
-                                        </p:tav>
-                                        <p:tav tm="100000">
-                                          <p:val>
-                                            <p:strVal val="#ppt_x"/>
-                                          </p:val>
-                                        </p:tav>
-                                      </p:tavLst>
-                                    </p:anim>
-                                    <p:anim calcmode="lin" valueType="num">
-                                      <p:cBhvr additive="base">
-                                        <p:cTn id="34" dur="500" fill="hold"/>
-                                        <p:tgtEl>
-                                          <p:spTgt spid="2052"/>
-                                        </p:tgtEl>
-                                        <p:attrNameLst>
-                                          <p:attrName>ppt_y</p:attrName>
-                                        </p:attrNameLst>
-                                      </p:cBhvr>
-                                      <p:tavLst>
-                                        <p:tav tm="0">
-                                          <p:val>
-                                            <p:strVal val="1+#ppt_h/2"/>
-                                          </p:val>
-                                        </p:tav>
-                                        <p:tav tm="100000">
-                                          <p:val>
-                                            <p:strVal val="#ppt_y"/>
-                                          </p:val>
-                                        </p:tav>
-                                      </p:tavLst>
-                                    </p:anim>
+                                    <p:animEffect transition="in" filter="fade">
+                                      <p:cBhvr>
+                                        <p:cTn id="31" dur="500"/>
+                                        <p:tgtEl>
+                                          <p:spTgt spid="2048"/>
+                                        </p:tgtEl>
+                                      </p:cBhvr>
+                                    </p:animEffect>
                                   </p:childTnLst>
                                 </p:cTn>
                               </p:par>
                               <p:par>
-                                <p:cTn id="35" presetID="2" presetClass="entr" presetSubtype="4" fill="hold" grpId="0" nodeType="withEffect">
+                                <p:cTn id="32" presetID="10" presetClass="entr" presetSubtype="0" fill="hold" nodeType="withEffect">
                                   <p:stCondLst>
                                     <p:cond delay="0"/>
                                   </p:stCondLst>
                                   <p:childTnLst>
                                     <p:set>
                                       <p:cBhvr>
+                                        <p:cTn id="33" dur="1" fill="hold">
+                                          <p:stCondLst>
+                                            <p:cond delay="0"/>
+                                          </p:stCondLst>
+                                        </p:cTn>
+                                        <p:tgtEl>
+                                          <p:spTgt spid="2051"/>
+                                        </p:tgtEl>
+                                        <p:attrNameLst>
+                                          <p:attrName>style.visibility</p:attrName>
+                                        </p:attrNameLst>
+                                      </p:cBhvr>
+                                      <p:to>
+                                        <p:strVal val="visible"/>
+                                      </p:to>
+                                    </p:set>
+                                    <p:animEffect transition="in" filter="fade">
+                                      <p:cBhvr>
+                                        <p:cTn id="34" dur="500"/>
+                                        <p:tgtEl>
+                                          <p:spTgt spid="2051"/>
+                                        </p:tgtEl>
+                                      </p:cBhvr>
+                                    </p:animEffect>
+                                  </p:childTnLst>
+                                </p:cTn>
+                              </p:par>
+                              <p:par>
+                                <p:cTn id="35" presetID="10" presetClass="entr" presetSubtype="0" fill="hold" grpId="0" nodeType="withEffect">
+                                  <p:stCondLst>
+                                    <p:cond delay="0"/>
+                                  </p:stCondLst>
+                                  <p:childTnLst>
+                                    <p:set>
+                                      <p:cBhvr>
                                         <p:cTn id="36" dur="1" fill="hold">
                                           <p:stCondLst>
                                             <p:cond delay="0"/>
                                           </p:stCondLst>
                                         </p:cTn>
                                         <p:tgtEl>
-                                          <p:spTgt spid="13"/>
+                                          <p:spTgt spid="2053"/>
                                         </p:tgtEl>
                                         <p:attrNameLst>
                                           <p:attrName>style.visibility</p:attrName>
@@ -15908,52 +16566,14 @@
                                         <p:strVal val="visible"/>
                                       </p:to>
                                     </p:set>
-                                    <p:anim calcmode="lin" valueType="num">
-                                      <p:cBhvr additive="base">
-                                        <p:cTn id="37" dur="500" fill="hold"/>
-                                        <p:tgtEl>
-                                          <p:spTgt spid="13"/>
-                                        </p:tgtEl>
-                                        <p:attrNameLst>
-                                          <p:attrName>ppt_x</p:attrName>
-                                        </p:attrNameLst>
-                                      </p:cBhvr>
-                                      <p:tavLst>
-                                        <p:tav tm="0">
-                                          <p:val>
-                                            <p:strVal val="#ppt_x"/>
-                                          </p:val>
-                                        </p:tav>
-                                        <p:tav tm="100000">
-                                          <p:val>
-                                            <p:strVal val="#ppt_x"/>
-                                          </p:val>
-                                        </p:tav>
-                                      </p:tavLst>
-                                    </p:anim>
-                                    <p:anim calcmode="lin" valueType="num">
-                                      <p:cBhvr additive="base">
-                                        <p:cTn id="38" dur="500" fill="hold"/>
-                                        <p:tgtEl>
-                                          <p:spTgt spid="13"/>
-                                        </p:tgtEl>
-                                        <p:attrNameLst>
-                                          <p:attrName>ppt_y</p:attrName>
-                                        </p:attrNameLst>
-                                      </p:cBhvr>
-                                      <p:tavLst>
-                                        <p:tav tm="0">
-                                          <p:val>
-                                            <p:strVal val="1+#ppt_h/2"/>
-                                          </p:val>
-                                        </p:tav>
-                                        <p:tav tm="100000">
-                                          <p:val>
-                                            <p:strVal val="#ppt_y"/>
-                                          </p:val>
-                                        </p:tav>
-                                      </p:tavLst>
-                                    </p:anim>
+                                    <p:animEffect transition="in" filter="fade">
+                                      <p:cBhvr>
+                                        <p:cTn id="37" dur="500"/>
+                                        <p:tgtEl>
+                                          <p:spTgt spid="2053"/>
+                                        </p:tgtEl>
+                                      </p:cBhvr>
+                                    </p:animEffect>
                                   </p:childTnLst>
                                 </p:cTn>
                               </p:par>
@@ -15964,26 +16584,290 @@
                     </p:cTn>
                   </p:par>
                   <p:par>
-                    <p:cTn id="39" fill="hold">
+                    <p:cTn id="38" fill="hold">
                       <p:stCondLst>
                         <p:cond delay="indefinite"/>
                       </p:stCondLst>
                       <p:childTnLst>
                         <p:par>
-                          <p:cTn id="40" fill="hold">
+                          <p:cTn id="39" fill="hold">
                             <p:stCondLst>
                               <p:cond delay="0"/>
                             </p:stCondLst>
                             <p:childTnLst>
                               <p:par>
-                                <p:cTn id="41" presetID="10" presetClass="exit" presetSubtype="0" fill="hold" grpId="1" nodeType="clickEffect">
+                                <p:cTn id="40" presetID="10" presetClass="entr" presetSubtype="0" fill="hold" nodeType="clickEffect">
+                                  <p:stCondLst>
+                                    <p:cond delay="0"/>
+                                  </p:stCondLst>
+                                  <p:childTnLst>
+                                    <p:set>
+                                      <p:cBhvr>
+                                        <p:cTn id="41" dur="1" fill="hold">
+                                          <p:stCondLst>
+                                            <p:cond delay="0"/>
+                                          </p:stCondLst>
+                                        </p:cTn>
+                                        <p:tgtEl>
+                                          <p:spTgt spid="11"/>
+                                        </p:tgtEl>
+                                        <p:attrNameLst>
+                                          <p:attrName>style.visibility</p:attrName>
+                                        </p:attrNameLst>
+                                      </p:cBhvr>
+                                      <p:to>
+                                        <p:strVal val="visible"/>
+                                      </p:to>
+                                    </p:set>
+                                    <p:animEffect transition="in" filter="fade">
+                                      <p:cBhvr>
+                                        <p:cTn id="42" dur="500"/>
+                                        <p:tgtEl>
+                                          <p:spTgt spid="11"/>
+                                        </p:tgtEl>
+                                      </p:cBhvr>
+                                    </p:animEffect>
+                                  </p:childTnLst>
+                                </p:cTn>
+                              </p:par>
+                              <p:par>
+                                <p:cTn id="43" presetID="10" presetClass="entr" presetSubtype="0" fill="hold" grpId="0" nodeType="withEffect">
+                                  <p:stCondLst>
+                                    <p:cond delay="0"/>
+                                  </p:stCondLst>
+                                  <p:childTnLst>
+                                    <p:set>
+                                      <p:cBhvr>
+                                        <p:cTn id="44" dur="1" fill="hold">
+                                          <p:stCondLst>
+                                            <p:cond delay="0"/>
+                                          </p:stCondLst>
+                                        </p:cTn>
+                                        <p:tgtEl>
+                                          <p:spTgt spid="14"/>
+                                        </p:tgtEl>
+                                        <p:attrNameLst>
+                                          <p:attrName>style.visibility</p:attrName>
+                                        </p:attrNameLst>
+                                      </p:cBhvr>
+                                      <p:to>
+                                        <p:strVal val="visible"/>
+                                      </p:to>
+                                    </p:set>
+                                    <p:animEffect transition="in" filter="fade">
+                                      <p:cBhvr>
+                                        <p:cTn id="45" dur="500"/>
+                                        <p:tgtEl>
+                                          <p:spTgt spid="14"/>
+                                        </p:tgtEl>
+                                      </p:cBhvr>
+                                    </p:animEffect>
+                                  </p:childTnLst>
+                                </p:cTn>
+                              </p:par>
+                            </p:childTnLst>
+                          </p:cTn>
+                        </p:par>
+                      </p:childTnLst>
+                    </p:cTn>
+                  </p:par>
+                  <p:par>
+                    <p:cTn id="46" fill="hold">
+                      <p:stCondLst>
+                        <p:cond delay="indefinite"/>
+                      </p:stCondLst>
+                      <p:childTnLst>
+                        <p:par>
+                          <p:cTn id="47" fill="hold">
+                            <p:stCondLst>
+                              <p:cond delay="0"/>
+                            </p:stCondLst>
+                            <p:childTnLst>
+                              <p:par>
+                                <p:cTn id="48" presetID="10" presetClass="entr" presetSubtype="0" fill="hold" nodeType="clickEffect">
+                                  <p:stCondLst>
+                                    <p:cond delay="0"/>
+                                  </p:stCondLst>
+                                  <p:childTnLst>
+                                    <p:set>
+                                      <p:cBhvr>
+                                        <p:cTn id="49" dur="1" fill="hold">
+                                          <p:stCondLst>
+                                            <p:cond delay="0"/>
+                                          </p:stCondLst>
+                                        </p:cTn>
+                                        <p:tgtEl>
+                                          <p:spTgt spid="2055"/>
+                                        </p:tgtEl>
+                                        <p:attrNameLst>
+                                          <p:attrName>style.visibility</p:attrName>
+                                        </p:attrNameLst>
+                                      </p:cBhvr>
+                                      <p:to>
+                                        <p:strVal val="visible"/>
+                                      </p:to>
+                                    </p:set>
+                                    <p:animEffect transition="in" filter="fade">
+                                      <p:cBhvr>
+                                        <p:cTn id="50" dur="500"/>
+                                        <p:tgtEl>
+                                          <p:spTgt spid="2055"/>
+                                        </p:tgtEl>
+                                      </p:cBhvr>
+                                    </p:animEffect>
+                                  </p:childTnLst>
+                                </p:cTn>
+                              </p:par>
+                              <p:par>
+                                <p:cTn id="51" presetID="10" presetClass="entr" presetSubtype="0" fill="hold" grpId="0" nodeType="withEffect">
+                                  <p:stCondLst>
+                                    <p:cond delay="0"/>
+                                  </p:stCondLst>
+                                  <p:childTnLst>
+                                    <p:set>
+                                      <p:cBhvr>
+                                        <p:cTn id="52" dur="1" fill="hold">
+                                          <p:stCondLst>
+                                            <p:cond delay="0"/>
+                                          </p:stCondLst>
+                                        </p:cTn>
+                                        <p:tgtEl>
+                                          <p:spTgt spid="2056"/>
+                                        </p:tgtEl>
+                                        <p:attrNameLst>
+                                          <p:attrName>style.visibility</p:attrName>
+                                        </p:attrNameLst>
+                                      </p:cBhvr>
+                                      <p:to>
+                                        <p:strVal val="visible"/>
+                                      </p:to>
+                                    </p:set>
+                                    <p:animEffect transition="in" filter="fade">
+                                      <p:cBhvr>
+                                        <p:cTn id="53" dur="500"/>
+                                        <p:tgtEl>
+                                          <p:spTgt spid="2056"/>
+                                        </p:tgtEl>
+                                      </p:cBhvr>
+                                    </p:animEffect>
+                                  </p:childTnLst>
+                                </p:cTn>
+                              </p:par>
+                            </p:childTnLst>
+                          </p:cTn>
+                        </p:par>
+                      </p:childTnLst>
+                    </p:cTn>
+                  </p:par>
+                  <p:par>
+                    <p:cTn id="54" fill="hold">
+                      <p:stCondLst>
+                        <p:cond delay="indefinite"/>
+                      </p:stCondLst>
+                      <p:childTnLst>
+                        <p:par>
+                          <p:cTn id="55" fill="hold">
+                            <p:stCondLst>
+                              <p:cond delay="0"/>
+                            </p:stCondLst>
+                            <p:childTnLst>
+                              <p:par>
+                                <p:cTn id="56" presetID="10" presetClass="entr" presetSubtype="0" fill="hold" nodeType="clickEffect">
+                                  <p:stCondLst>
+                                    <p:cond delay="0"/>
+                                  </p:stCondLst>
+                                  <p:childTnLst>
+                                    <p:set>
+                                      <p:cBhvr>
+                                        <p:cTn id="57" dur="1" fill="hold">
+                                          <p:stCondLst>
+                                            <p:cond delay="0"/>
+                                          </p:stCondLst>
+                                        </p:cTn>
+                                        <p:tgtEl>
+                                          <p:spTgt spid="20"/>
+                                        </p:tgtEl>
+                                        <p:attrNameLst>
+                                          <p:attrName>style.visibility</p:attrName>
+                                        </p:attrNameLst>
+                                      </p:cBhvr>
+                                      <p:to>
+                                        <p:strVal val="visible"/>
+                                      </p:to>
+                                    </p:set>
+                                    <p:animEffect transition="in" filter="fade">
+                                      <p:cBhvr>
+                                        <p:cTn id="58" dur="500"/>
+                                        <p:tgtEl>
+                                          <p:spTgt spid="20"/>
+                                        </p:tgtEl>
+                                      </p:cBhvr>
+                                    </p:animEffect>
+                                  </p:childTnLst>
+                                </p:cTn>
+                              </p:par>
+                              <p:par>
+                                <p:cTn id="59" presetID="10" presetClass="entr" presetSubtype="0" fill="hold" grpId="0" nodeType="withEffect">
+                                  <p:stCondLst>
+                                    <p:cond delay="0"/>
+                                  </p:stCondLst>
+                                  <p:childTnLst>
+                                    <p:set>
+                                      <p:cBhvr>
+                                        <p:cTn id="60" dur="1" fill="hold">
+                                          <p:stCondLst>
+                                            <p:cond delay="0"/>
+                                          </p:stCondLst>
+                                        </p:cTn>
+                                        <p:tgtEl>
+                                          <p:spTgt spid="29"/>
+                                        </p:tgtEl>
+                                        <p:attrNameLst>
+                                          <p:attrName>style.visibility</p:attrName>
+                                        </p:attrNameLst>
+                                      </p:cBhvr>
+                                      <p:to>
+                                        <p:strVal val="visible"/>
+                                      </p:to>
+                                    </p:set>
+                                    <p:animEffect transition="in" filter="fade">
+                                      <p:cBhvr>
+                                        <p:cTn id="61" dur="500"/>
+                                        <p:tgtEl>
+                                          <p:spTgt spid="29"/>
+                                        </p:tgtEl>
+                                      </p:cBhvr>
+                                    </p:animEffect>
+                                  </p:childTnLst>
+                                </p:cTn>
+                              </p:par>
+                            </p:childTnLst>
+                          </p:cTn>
+                        </p:par>
+                      </p:childTnLst>
+                    </p:cTn>
+                  </p:par>
+                  <p:par>
+                    <p:cTn id="62" fill="hold">
+                      <p:stCondLst>
+                        <p:cond delay="indefinite"/>
+                      </p:stCondLst>
+                      <p:childTnLst>
+                        <p:par>
+                          <p:cTn id="63" fill="hold">
+                            <p:stCondLst>
+                              <p:cond delay="0"/>
+                            </p:stCondLst>
+                            <p:childTnLst>
+                              <p:par>
+                                <p:cTn id="64" presetID="10" presetClass="exit" presetSubtype="0" fill="hold" grpId="1" nodeType="clickEffect">
                                   <p:stCondLst>
                                     <p:cond delay="0"/>
                                   </p:stCondLst>
                                   <p:childTnLst>
                                     <p:animEffect transition="out" filter="fade">
                                       <p:cBhvr>
-                                        <p:cTn id="42" dur="500"/>
+                                        <p:cTn id="65" dur="500"/>
                                         <p:tgtEl>
                                           <p:spTgt spid="8"/>
                                         </p:tgtEl>
@@ -15991,7 +16875,7 @@
                                     </p:animEffect>
                                     <p:set>
                                       <p:cBhvr>
-                                        <p:cTn id="43" dur="1" fill="hold">
+                                        <p:cTn id="66" dur="1" fill="hold">
                                           <p:stCondLst>
                                             <p:cond delay="499"/>
                                           </p:stCondLst>
@@ -16011,14 +16895,14 @@
                                 </p:cTn>
                               </p:par>
                               <p:par>
-                                <p:cTn id="44" presetID="10" presetClass="exit" presetSubtype="0" fill="hold" grpId="1" nodeType="withEffect">
+                                <p:cTn id="67" presetID="10" presetClass="exit" presetSubtype="0" fill="hold" grpId="1" nodeType="withEffect">
                                   <p:stCondLst>
                                     <p:cond delay="0"/>
                                   </p:stCondLst>
                                   <p:childTnLst>
                                     <p:animEffect transition="out" filter="fade">
                                       <p:cBhvr>
-                                        <p:cTn id="45" dur="500"/>
+                                        <p:cTn id="68" dur="500"/>
                                         <p:tgtEl>
                                           <p:spTgt spid="9"/>
                                         </p:tgtEl>
@@ -16026,7 +16910,7 @@
                                     </p:animEffect>
                                     <p:set>
                                       <p:cBhvr>
-                                        <p:cTn id="46" dur="1" fill="hold">
+                                        <p:cTn id="69" dur="1" fill="hold">
                                           <p:stCondLst>
                                             <p:cond delay="499"/>
                                           </p:stCondLst>
@@ -16046,28 +16930,28 @@
                                 </p:cTn>
                               </p:par>
                               <p:par>
-                                <p:cTn id="47" presetID="10" presetClass="exit" presetSubtype="0" fill="hold" grpId="1" nodeType="withEffect">
+                                <p:cTn id="70" presetID="10" presetClass="exit" presetSubtype="0" fill="hold" grpId="1" nodeType="withEffect">
                                   <p:stCondLst>
                                     <p:cond delay="0"/>
                                   </p:stCondLst>
                                   <p:childTnLst>
                                     <p:animEffect transition="out" filter="fade">
                                       <p:cBhvr>
-                                        <p:cTn id="48" dur="500"/>
-                                        <p:tgtEl>
-                                          <p:spTgt spid="12"/>
+                                        <p:cTn id="71" dur="500"/>
+                                        <p:tgtEl>
+                                          <p:spTgt spid="26"/>
                                         </p:tgtEl>
                                       </p:cBhvr>
                                     </p:animEffect>
                                     <p:set>
                                       <p:cBhvr>
-                                        <p:cTn id="49" dur="1" fill="hold">
+                                        <p:cTn id="72" dur="1" fill="hold">
                                           <p:stCondLst>
                                             <p:cond delay="499"/>
                                           </p:stCondLst>
                                         </p:cTn>
                                         <p:tgtEl>
-                                          <p:spTgt spid="12"/>
+                                          <p:spTgt spid="26"/>
                                         </p:tgtEl>
                                         <p:attrNameLst>
                                           <p:attrName>style.visibility</p:attrName>
@@ -16081,28 +16965,28 @@
                                 </p:cTn>
                               </p:par>
                               <p:par>
-                                <p:cTn id="50" presetID="10" presetClass="exit" presetSubtype="0" fill="hold" grpId="1" nodeType="withEffect">
+                                <p:cTn id="73" presetID="10" presetClass="exit" presetSubtype="0" fill="hold" grpId="1" nodeType="withEffect">
                                   <p:stCondLst>
                                     <p:cond delay="0"/>
                                   </p:stCondLst>
                                   <p:childTnLst>
                                     <p:animEffect transition="out" filter="fade">
                                       <p:cBhvr>
-                                        <p:cTn id="51" dur="500"/>
-                                        <p:tgtEl>
-                                          <p:spTgt spid="13"/>
+                                        <p:cTn id="74" dur="500"/>
+                                        <p:tgtEl>
+                                          <p:spTgt spid="5"/>
                                         </p:tgtEl>
                                       </p:cBhvr>
                                     </p:animEffect>
                                     <p:set>
                                       <p:cBhvr>
-                                        <p:cTn id="52" dur="1" fill="hold">
+                                        <p:cTn id="75" dur="1" fill="hold">
                                           <p:stCondLst>
                                             <p:cond delay="499"/>
                                           </p:stCondLst>
                                         </p:cTn>
                                         <p:tgtEl>
-                                          <p:spTgt spid="13"/>
+                                          <p:spTgt spid="5"/>
                                         </p:tgtEl>
                                         <p:attrNameLst>
                                           <p:attrName>style.visibility</p:attrName>
@@ -16116,28 +17000,133 @@
                                 </p:cTn>
                               </p:par>
                               <p:par>
-                                <p:cTn id="53" presetID="10" presetClass="exit" presetSubtype="0" fill="hold" grpId="1" nodeType="withEffect">
+                                <p:cTn id="76" presetID="10" presetClass="exit" presetSubtype="0" fill="hold" grpId="1" nodeType="withEffect">
                                   <p:stCondLst>
                                     <p:cond delay="0"/>
                                   </p:stCondLst>
                                   <p:childTnLst>
                                     <p:animEffect transition="out" filter="fade">
                                       <p:cBhvr>
-                                        <p:cTn id="54" dur="500"/>
-                                        <p:tgtEl>
-                                          <p:spTgt spid="26"/>
+                                        <p:cTn id="77" dur="500"/>
+                                        <p:tgtEl>
+                                          <p:spTgt spid="2053"/>
                                         </p:tgtEl>
                                       </p:cBhvr>
                                     </p:animEffect>
                                     <p:set>
                                       <p:cBhvr>
-                                        <p:cTn id="55" dur="1" fill="hold">
+                                        <p:cTn id="78" dur="1" fill="hold">
                                           <p:stCondLst>
                                             <p:cond delay="499"/>
                                           </p:stCondLst>
                                         </p:cTn>
                                         <p:tgtEl>
-                                          <p:spTgt spid="26"/>
+                                          <p:spTgt spid="2053"/>
+                                        </p:tgtEl>
+                                        <p:attrNameLst>
+                                          <p:attrName>style.visibility</p:attrName>
+                                        </p:attrNameLst>
+                                      </p:cBhvr>
+                                      <p:to>
+                                        <p:strVal val="hidden"/>
+                                      </p:to>
+                                    </p:set>
+                                  </p:childTnLst>
+                                </p:cTn>
+                              </p:par>
+                              <p:par>
+                                <p:cTn id="79" presetID="10" presetClass="exit" presetSubtype="0" fill="hold" grpId="1" nodeType="withEffect">
+                                  <p:stCondLst>
+                                    <p:cond delay="0"/>
+                                  </p:stCondLst>
+                                  <p:childTnLst>
+                                    <p:animEffect transition="out" filter="fade">
+                                      <p:cBhvr>
+                                        <p:cTn id="80" dur="500"/>
+                                        <p:tgtEl>
+                                          <p:spTgt spid="14"/>
+                                        </p:tgtEl>
+                                      </p:cBhvr>
+                                    </p:animEffect>
+                                    <p:set>
+                                      <p:cBhvr>
+                                        <p:cTn id="81" dur="1" fill="hold">
+                                          <p:stCondLst>
+                                            <p:cond delay="499"/>
+                                          </p:stCondLst>
+                                        </p:cTn>
+                                        <p:tgtEl>
+                                          <p:spTgt spid="14"/>
+                                        </p:tgtEl>
+                                        <p:attrNameLst>
+                                          <p:attrName>style.visibility</p:attrName>
+                                        </p:attrNameLst>
+                                      </p:cBhvr>
+                                      <p:to>
+                                        <p:strVal val="hidden"/>
+                                      </p:to>
+                                    </p:set>
+                                  </p:childTnLst>
+                                </p:cTn>
+                              </p:par>
+                              <p:par>
+                                <p:cTn id="82" presetID="10" presetClass="exit" presetSubtype="0" fill="hold" grpId="1" nodeType="withEffect">
+                                  <p:stCondLst>
+                                    <p:cond delay="0"/>
+                                  </p:stCondLst>
+                                  <p:childTnLst>
+                                    <p:animEffect transition="out" filter="fade">
+                                      <p:cBhvr>
+                                        <p:cTn id="83" dur="500"/>
+                                        <p:tgtEl>
+                                          <p:spTgt spid="2056"/>
+                                        </p:tgtEl>
+                                      </p:cBhvr>
+                                    </p:animEffect>
+                                    <p:set>
+                                      <p:cBhvr>
+                                        <p:cTn id="84" dur="1" fill="hold">
+                                          <p:stCondLst>
+                                            <p:cond delay="499"/>
+                                          </p:stCondLst>
+                                        </p:cTn>
+                                        <p:tgtEl>
+                                          <p:spTgt spid="2056"/>
+                                        </p:tgtEl>
+                                        <p:attrNameLst>
+                                          <p:attrName>style.visibility</p:attrName>
+                                        </p:attrNameLst>
+                                      </p:cBhvr>
+                                      <p:to>
+                                        <p:strVal val="hidden"/>
+                                      </p:to>
+                                    </p:set>
+                                  </p:childTnLst>
+                                </p:cTn>
+                              </p:par>
+                              <p:par>
+                                <p:cTn id="85" presetID="10" presetClass="exit" presetSubtype="0" fill="hold" grpId="1" nodeType="withEffect">
+                                  <p:stCondLst>
+                                    <p:cond delay="0"/>
+                                  </p:stCondLst>
+                                  <p:childTnLst>
+                                    <p:animEffect transition="out" filter="fade">
+                                      <p:cBhvr>
+                                        <p:cTn id="86" dur="500"/>
+                                        <p:tgtEl>
+                                          <p:spTgt spid="29"/>
+                                        </p:tgtEl>
+                                      </p:cBhvr>
+                                    </p:animEffect>
+                                    <p:set>
+                                      <p:cBhvr>
+                                        <p:cTn id="87" dur="1" fill="hold">
+                                          <p:stCondLst>
+                                            <p:cond delay="499"/>
+                                          </p:stCondLst>
+                                        </p:cTn>
+                                        <p:tgtEl>
+                                          <p:spTgt spid="29"/>
                                         </p:tgtEl>
                                         <p:attrNameLst>
                                           <p:attrName>style.visibility</p:attrName>
@@ -16157,26 +17146,26 @@
                     </p:cTn>
                   </p:par>
                   <p:par>
-                    <p:cTn id="56" fill="hold">
+                    <p:cTn id="88" fill="hold">
                       <p:stCondLst>
                         <p:cond delay="indefinite"/>
                       </p:stCondLst>
                       <p:childTnLst>
                         <p:par>
-                          <p:cTn id="57" fill="hold">
+                          <p:cTn id="89" fill="hold">
                             <p:stCondLst>
                               <p:cond delay="0"/>
                             </p:stCondLst>
                             <p:childTnLst>
                               <p:par>
-                                <p:cTn id="58" presetID="10" presetClass="entr" presetSubtype="0" fill="hold" grpId="0" nodeType="clickEffect">
+                                <p:cTn id="90" presetID="10" presetClass="entr" presetSubtype="0" fill="hold" grpId="0" nodeType="clickEffect">
                                   <p:stCondLst>
                                     <p:cond delay="0"/>
                                   </p:stCondLst>
                                   <p:childTnLst>
                                     <p:set>
                                       <p:cBhvr>
-                                        <p:cTn id="59" dur="1" fill="hold">
+                                        <p:cTn id="91" dur="1" fill="hold">
                                           <p:stCondLst>
                                             <p:cond delay="0"/>
                                           </p:stCondLst>
@@ -16194,7 +17183,7 @@
                                     </p:set>
                                     <p:animEffect transition="in" filter="fade">
                                       <p:cBhvr>
-                                        <p:cTn id="60" dur="500"/>
+                                        <p:cTn id="92" dur="500"/>
                                         <p:tgtEl>
                                           <p:spTgt spid="16"/>
                                         </p:tgtEl>
@@ -16204,14 +17193,14 @@
                                 </p:cTn>
                               </p:par>
                               <p:par>
-                                <p:cTn id="61" presetID="10" presetClass="entr" presetSubtype="0" fill="hold" nodeType="withEffect">
+                                <p:cTn id="93" presetID="10" presetClass="entr" presetSubtype="0" fill="hold" nodeType="withEffect">
                                   <p:stCondLst>
                                     <p:cond delay="0"/>
                                   </p:stCondLst>
                                   <p:childTnLst>
                                     <p:set>
                                       <p:cBhvr>
-                                        <p:cTn id="62" dur="1" fill="hold">
+                                        <p:cTn id="94" dur="1" fill="hold">
                                           <p:stCondLst>
                                             <p:cond delay="0"/>
                                           </p:stCondLst>
@@ -16229,9 +17218,79 @@
                                     </p:set>
                                     <p:animEffect transition="in" filter="fade">
                                       <p:cBhvr>
-                                        <p:cTn id="63" dur="500"/>
+                                        <p:cTn id="95" dur="500"/>
                                         <p:tgtEl>
                                           <p:spTgt spid="15"/>
+                                        </p:tgtEl>
+                                      </p:cBhvr>
+                                    </p:animEffect>
+                                  </p:childTnLst>
+                                </p:cTn>
+                              </p:par>
+                              <p:par>
+                                <p:cTn id="96" presetID="10" presetClass="entr" presetSubtype="0" fill="hold" grpId="0" nodeType="withEffect">
+                                  <p:stCondLst>
+                                    <p:cond delay="0"/>
+                                  </p:stCondLst>
+                                  <p:childTnLst>
+                                    <p:set>
+                                      <p:cBhvr>
+                                        <p:cTn id="97" dur="1" fill="hold">
+                                          <p:stCondLst>
+                                            <p:cond delay="0"/>
+                                          </p:stCondLst>
+                                        </p:cTn>
+                                        <p:tgtEl>
+                                          <p:spTgt spid="19"/>
+                                        </p:tgtEl>
+                                        <p:attrNameLst>
+                                          <p:attrName>style.visibility</p:attrName>
+                                        </p:attrNameLst>
+                                      </p:cBhvr>
+                                      <p:to>
+                                        <p:strVal val="visible"/>
+                                      </p:to>
+                                    </p:set>
+                                    <p:animEffect transition="in" filter="fade">
+                                      <p:cBhvr>
+                                        <p:cTn id="98" dur="500"/>
+                                        <p:tgtEl>
+                                          <p:spTgt spid="19"/>
+                                        </p:tgtEl>
+                                      </p:cBhvr>
+                                    </p:animEffect>
+                                  </p:childTnLst>
+                                </p:cTn>
+                              </p:par>
+                              <p:par>
+                                <p:cTn id="99" presetID="10" presetClass="entr" presetSubtype="0" fill="hold" nodeType="withEffect">
+                                  <p:stCondLst>
+                                    <p:cond delay="0"/>
+                                  </p:stCondLst>
+                                  <p:childTnLst>
+                                    <p:set>
+                                      <p:cBhvr>
+                                        <p:cTn id="100" dur="1" fill="hold">
+                                          <p:stCondLst>
+                                            <p:cond delay="0"/>
+                                          </p:stCondLst>
+                                        </p:cTn>
+                                        <p:tgtEl>
+                                          <p:spTgt spid="18"/>
+                                        </p:tgtEl>
+                                        <p:attrNameLst>
+                                          <p:attrName>style.visibility</p:attrName>
+                                        </p:attrNameLst>
+                                      </p:cBhvr>
+                                      <p:to>
+                                        <p:strVal val="visible"/>
+                                      </p:to>
+                                    </p:set>
+                                    <p:animEffect transition="in" filter="fade">
+                                      <p:cBhvr>
+                                        <p:cTn id="101" dur="500"/>
+                                        <p:tgtEl>
+                                          <p:spTgt spid="18"/>
                                         </p:tgtEl>
                                       </p:cBhvr>
                                     </p:animEffect>
@@ -16245,32 +17304,32 @@
                     </p:cTn>
                   </p:par>
                   <p:par>
-                    <p:cTn id="64" fill="hold">
+                    <p:cTn id="102" fill="hold">
                       <p:stCondLst>
                         <p:cond delay="indefinite"/>
                       </p:stCondLst>
                       <p:childTnLst>
                         <p:par>
-                          <p:cTn id="65" fill="hold">
+                          <p:cTn id="103" fill="hold">
                             <p:stCondLst>
                               <p:cond delay="0"/>
                             </p:stCondLst>
                             <p:childTnLst>
                               <p:par>
-                                <p:cTn id="66" presetID="10" presetClass="entr" presetSubtype="0" fill="hold" grpId="0" nodeType="clickEffect">
+                                <p:cTn id="104" presetID="10" presetClass="entr" presetSubtype="0" fill="hold" grpId="0" nodeType="clickEffect">
                                   <p:stCondLst>
                                     <p:cond delay="0"/>
                                   </p:stCondLst>
                                   <p:childTnLst>
                                     <p:set>
                                       <p:cBhvr>
-                                        <p:cTn id="67" dur="1" fill="hold">
+                                        <p:cTn id="105" dur="1" fill="hold">
                                           <p:stCondLst>
                                             <p:cond delay="0"/>
                                           </p:stCondLst>
                                         </p:cTn>
                                         <p:tgtEl>
-                                          <p:spTgt spid="19"/>
+                                          <p:spTgt spid="2059"/>
                                         </p:tgtEl>
                                         <p:attrNameLst>
                                           <p:attrName>style.visibility</p:attrName>
@@ -16282,9 +17341,9 @@
                                     </p:set>
                                     <p:animEffect transition="in" filter="fade">
                                       <p:cBhvr>
-                                        <p:cTn id="68" dur="500"/>
-                                        <p:tgtEl>
-                                          <p:spTgt spid="19"/>
+                                        <p:cTn id="106" dur="500"/>
+                                        <p:tgtEl>
+                                          <p:spTgt spid="2059"/>
                                         </p:tgtEl>
                                       </p:cBhvr>
                                     </p:animEffect>
@@ -16292,20 +17351,20 @@
                                 </p:cTn>
                               </p:par>
                               <p:par>
-                                <p:cTn id="69" presetID="10" presetClass="entr" presetSubtype="0" fill="hold" nodeType="withEffect">
+                                <p:cTn id="107" presetID="10" presetClass="entr" presetSubtype="0" fill="hold" nodeType="withEffect">
                                   <p:stCondLst>
                                     <p:cond delay="0"/>
                                   </p:stCondLst>
                                   <p:childTnLst>
                                     <p:set>
                                       <p:cBhvr>
-                                        <p:cTn id="70" dur="1" fill="hold">
+                                        <p:cTn id="108" dur="1" fill="hold">
                                           <p:stCondLst>
                                             <p:cond delay="0"/>
                                           </p:stCondLst>
                                         </p:cTn>
                                         <p:tgtEl>
-                                          <p:spTgt spid="18"/>
+                                          <p:spTgt spid="2058"/>
                                         </p:tgtEl>
                                         <p:attrNameLst>
                                           <p:attrName>style.visibility</p:attrName>
@@ -16317,9 +17376,9 @@
                                     </p:set>
                                     <p:animEffect transition="in" filter="fade">
                                       <p:cBhvr>
-                                        <p:cTn id="71" dur="500"/>
-                                        <p:tgtEl>
-                                          <p:spTgt spid="18"/>
+                                        <p:cTn id="109" dur="500"/>
+                                        <p:tgtEl>
+                                          <p:spTgt spid="2058"/>
                                         </p:tgtEl>
                                       </p:cBhvr>
                                     </p:animEffect>
@@ -16333,32 +17392,32 @@
                     </p:cTn>
                   </p:par>
                   <p:par>
-                    <p:cTn id="72" fill="hold">
+                    <p:cTn id="110" fill="hold">
                       <p:stCondLst>
                         <p:cond delay="indefinite"/>
                       </p:stCondLst>
                       <p:childTnLst>
                         <p:par>
-                          <p:cTn id="73" fill="hold">
+                          <p:cTn id="111" fill="hold">
                             <p:stCondLst>
                               <p:cond delay="0"/>
                             </p:stCondLst>
                             <p:childTnLst>
                               <p:par>
-                                <p:cTn id="74" presetID="10" presetClass="entr" presetSubtype="0" fill="hold" grpId="0" nodeType="clickEffect">
+                                <p:cTn id="112" presetID="10" presetClass="entr" presetSubtype="0" fill="hold" nodeType="clickEffect">
                                   <p:stCondLst>
                                     <p:cond delay="0"/>
                                   </p:stCondLst>
                                   <p:childTnLst>
                                     <p:set>
                                       <p:cBhvr>
-                                        <p:cTn id="75" dur="1" fill="hold">
+                                        <p:cTn id="113" dur="1" fill="hold">
                                           <p:stCondLst>
                                             <p:cond delay="0"/>
                                           </p:stCondLst>
                                         </p:cTn>
                                         <p:tgtEl>
-                                          <p:spTgt spid="22"/>
+                                          <p:spTgt spid="2061"/>
                                         </p:tgtEl>
                                         <p:attrNameLst>
                                           <p:attrName>style.visibility</p:attrName>
@@ -16370,9 +17429,9 @@
                                     </p:set>
                                     <p:animEffect transition="in" filter="fade">
                                       <p:cBhvr>
-                                        <p:cTn id="76" dur="500"/>
-                                        <p:tgtEl>
-                                          <p:spTgt spid="22"/>
+                                        <p:cTn id="114" dur="500"/>
+                                        <p:tgtEl>
+                                          <p:spTgt spid="2061"/>
                                         </p:tgtEl>
                                       </p:cBhvr>
                                     </p:animEffect>
@@ -16380,20 +17439,20 @@
                                 </p:cTn>
                               </p:par>
                               <p:par>
-                                <p:cTn id="77" presetID="10" presetClass="entr" presetSubtype="0" fill="hold" nodeType="withEffect">
+                                <p:cTn id="115" presetID="10" presetClass="entr" presetSubtype="0" fill="hold" grpId="0" nodeType="withEffect">
                                   <p:stCondLst>
                                     <p:cond delay="0"/>
                                   </p:stCondLst>
                                   <p:childTnLst>
                                     <p:set>
                                       <p:cBhvr>
-                                        <p:cTn id="78" dur="1" fill="hold">
+                                        <p:cTn id="116" dur="1" fill="hold">
                                           <p:stCondLst>
                                             <p:cond delay="0"/>
                                           </p:stCondLst>
                                         </p:cTn>
                                         <p:tgtEl>
-                                          <p:spTgt spid="21"/>
+                                          <p:spTgt spid="2062"/>
                                         </p:tgtEl>
                                         <p:attrNameLst>
                                           <p:attrName>style.visibility</p:attrName>
@@ -16405,9 +17464,9 @@
                                     </p:set>
                                     <p:animEffect transition="in" filter="fade">
                                       <p:cBhvr>
-                                        <p:cTn id="79" dur="500"/>
-                                        <p:tgtEl>
-                                          <p:spTgt spid="21"/>
+                                        <p:cTn id="117" dur="500"/>
+                                        <p:tgtEl>
+                                          <p:spTgt spid="2062"/>
                                         </p:tgtEl>
                                       </p:cBhvr>
                                     </p:animEffect>
@@ -16421,32 +17480,32 @@
                     </p:cTn>
                   </p:par>
                   <p:par>
-                    <p:cTn id="80" fill="hold">
+                    <p:cTn id="118" fill="hold">
                       <p:stCondLst>
                         <p:cond delay="indefinite"/>
                       </p:stCondLst>
                       <p:childTnLst>
                         <p:par>
-                          <p:cTn id="81" fill="hold">
+                          <p:cTn id="119" fill="hold">
                             <p:stCondLst>
                               <p:cond delay="0"/>
                             </p:stCondLst>
                             <p:childTnLst>
                               <p:par>
-                                <p:cTn id="82" presetID="10" presetClass="entr" presetSubtype="0" fill="hold" nodeType="clickEffect">
+                                <p:cTn id="120" presetID="10" presetClass="entr" presetSubtype="0" fill="hold" grpId="0" nodeType="clickEffect">
                                   <p:stCondLst>
                                     <p:cond delay="0"/>
                                   </p:stCondLst>
                                   <p:childTnLst>
                                     <p:set>
                                       <p:cBhvr>
-                                        <p:cTn id="83" dur="1" fill="hold">
+                                        <p:cTn id="121" dur="1" fill="hold">
                                           <p:stCondLst>
                                             <p:cond delay="0"/>
                                           </p:stCondLst>
                                         </p:cTn>
                                         <p:tgtEl>
-                                          <p:spTgt spid="24"/>
+                                          <p:spTgt spid="2065"/>
                                         </p:tgtEl>
                                         <p:attrNameLst>
                                           <p:attrName>style.visibility</p:attrName>
@@ -16458,9 +17517,9 @@
                                     </p:set>
                                     <p:animEffect transition="in" filter="fade">
                                       <p:cBhvr>
-                                        <p:cTn id="84" dur="500"/>
-                                        <p:tgtEl>
-                                          <p:spTgt spid="24"/>
+                                        <p:cTn id="122" dur="500"/>
+                                        <p:tgtEl>
+                                          <p:spTgt spid="2065"/>
                                         </p:tgtEl>
                                       </p:cBhvr>
                                     </p:animEffect>
@@ -16468,20 +17527,20 @@
                                 </p:cTn>
                               </p:par>
                               <p:par>
-                                <p:cTn id="85" presetID="10" presetClass="entr" presetSubtype="0" fill="hold" grpId="0" nodeType="withEffect">
+                                <p:cTn id="123" presetID="10" presetClass="entr" presetSubtype="0" fill="hold" nodeType="withEffect">
                                   <p:stCondLst>
                                     <p:cond delay="0"/>
                                   </p:stCondLst>
                                   <p:childTnLst>
                                     <p:set>
                                       <p:cBhvr>
-                                        <p:cTn id="86" dur="1" fill="hold">
+                                        <p:cTn id="124" dur="1" fill="hold">
                                           <p:stCondLst>
                                             <p:cond delay="0"/>
                                           </p:stCondLst>
                                         </p:cTn>
                                         <p:tgtEl>
-                                          <p:spTgt spid="25"/>
+                                          <p:spTgt spid="2064"/>
                                         </p:tgtEl>
                                         <p:attrNameLst>
                                           <p:attrName>style.visibility</p:attrName>
@@ -16493,9 +17552,62 @@
                                     </p:set>
                                     <p:animEffect transition="in" filter="fade">
                                       <p:cBhvr>
-                                        <p:cTn id="87" dur="500"/>
-                                        <p:tgtEl>
-                                          <p:spTgt spid="25"/>
+                                        <p:cTn id="125" dur="500"/>
+                                        <p:tgtEl>
+                                          <p:spTgt spid="2064"/>
+                                        </p:tgtEl>
+                                      </p:cBhvr>
+                                    </p:animEffect>
+                                  </p:childTnLst>
+                                </p:cTn>
+                              </p:par>
+                            </p:childTnLst>
+                          </p:cTn>
+                        </p:par>
+                      </p:childTnLst>
+                    </p:cTn>
+                  </p:par>
+                  <p:par>
+                    <p:cTn id="126" fill="hold">
+                      <p:stCondLst>
+                        <p:cond delay="indefinite"/>
+                      </p:stCondLst>
+                      <p:childTnLst>
+                        <p:par>
+                          <p:cTn id="127" fill="hold">
+                            <p:stCondLst>
+                              <p:cond delay="0"/>
+                            </p:stCondLst>
+                            <p:childTnLst>
+                              <p:par>
+                                <p:cTn id="128" presetID="10" presetClass="entr" presetSubtype="0" fill="hold" grpId="0" nodeType="clickEffect">
+                                  <p:stCondLst>
+                                    <p:cond delay="0"/>
+                                  </p:stCondLst>
+                                  <p:childTnLst>
+                                    <p:set>
+                                      <p:cBhvr>
+                                        <p:cTn id="129" dur="1" fill="hold">
+                                          <p:stCondLst>
+                                            <p:cond delay="0"/>
+                                          </p:stCondLst>
+                                        </p:cTn>
+                                        <p:tgtEl>
+                                          <p:spTgt spid="2069"/>
+                                        </p:tgtEl>
+                                        <p:attrNameLst>
+                                          <p:attrName>style.visibility</p:attrName>
+                                        </p:attrNameLst>
+                                      </p:cBhvr>
+                                      <p:to>
+                                        <p:strVal val="visible"/>
+                                      </p:to>
+                                    </p:set>
+                                    <p:animEffect transition="in" filter="fade">
+                                      <p:cBhvr>
+                                        <p:cTn id="130" dur="500"/>
+                                        <p:tgtEl>
+                                          <p:spTgt spid="2069"/>
                                         </p:tgtEl>
                                       </p:cBhvr>
                                     </p:animEffect>
@@ -16503,20 +17615,20 @@
                                 </p:cTn>
                               </p:par>
                               <p:par>
-                                <p:cTn id="88" presetID="10" presetClass="entr" presetSubtype="0" fill="hold" nodeType="withEffect">
+                                <p:cTn id="131" presetID="10" presetClass="entr" presetSubtype="0" fill="hold" nodeType="withEffect">
                                   <p:stCondLst>
                                     <p:cond delay="0"/>
                                   </p:stCondLst>
                                   <p:childTnLst>
                                     <p:set>
                                       <p:cBhvr>
-                                        <p:cTn id="89" dur="1" fill="hold">
+                                        <p:cTn id="132" dur="1" fill="hold">
                                           <p:stCondLst>
                                             <p:cond delay="0"/>
                                           </p:stCondLst>
                                         </p:cTn>
                                         <p:tgtEl>
-                                          <p:spTgt spid="27"/>
+                                          <p:spTgt spid="2067"/>
                                         </p:tgtEl>
                                         <p:attrNameLst>
                                           <p:attrName>style.visibility</p:attrName>
@@ -16528,9 +17640,62 @@
                                     </p:set>
                                     <p:animEffect transition="in" filter="fade">
                                       <p:cBhvr>
-                                        <p:cTn id="90" dur="500"/>
-                                        <p:tgtEl>
-                                          <p:spTgt spid="27"/>
+                                        <p:cTn id="133" dur="500"/>
+                                        <p:tgtEl>
+                                          <p:spTgt spid="2067"/>
+                                        </p:tgtEl>
+                                      </p:cBhvr>
+                                    </p:animEffect>
+                                  </p:childTnLst>
+                                </p:cTn>
+                              </p:par>
+                            </p:childTnLst>
+                          </p:cTn>
+                        </p:par>
+                      </p:childTnLst>
+                    </p:cTn>
+                  </p:par>
+                  <p:par>
+                    <p:cTn id="134" fill="hold">
+                      <p:stCondLst>
+                        <p:cond delay="indefinite"/>
+                      </p:stCondLst>
+                      <p:childTnLst>
+                        <p:par>
+                          <p:cTn id="135" fill="hold">
+                            <p:stCondLst>
+                              <p:cond delay="0"/>
+                            </p:stCondLst>
+                            <p:childTnLst>
+                              <p:par>
+                                <p:cTn id="136" presetID="10" presetClass="entr" presetSubtype="0" fill="hold" nodeType="clickEffect">
+                                  <p:stCondLst>
+                                    <p:cond delay="0"/>
+                                  </p:stCondLst>
+                                  <p:childTnLst>
+                                    <p:set>
+                                      <p:cBhvr>
+                                        <p:cTn id="137" dur="1" fill="hold">
+                                          <p:stCondLst>
+                                            <p:cond delay="0"/>
+                                          </p:stCondLst>
+                                        </p:cTn>
+                                        <p:tgtEl>
+                                          <p:spTgt spid="2071"/>
+                                        </p:tgtEl>
+                                        <p:attrNameLst>
+                                          <p:attrName>style.visibility</p:attrName>
+                                        </p:attrNameLst>
+                                      </p:cBhvr>
+                                      <p:to>
+                                        <p:strVal val="visible"/>
+                                      </p:to>
+                                    </p:set>
+                                    <p:animEffect transition="in" filter="fade">
+                                      <p:cBhvr>
+                                        <p:cTn id="138" dur="500"/>
+                                        <p:tgtEl>
+                                          <p:spTgt spid="2071"/>
                                         </p:tgtEl>
                                       </p:cBhvr>
                                     </p:animEffect>
@@ -16538,20 +17703,20 @@
                                 </p:cTn>
                               </p:par>
                               <p:par>
-                                <p:cTn id="91" presetID="10" presetClass="entr" presetSubtype="0" fill="hold" grpId="0" nodeType="withEffect">
+                                <p:cTn id="139" presetID="10" presetClass="entr" presetSubtype="0" fill="hold" grpId="0" nodeType="withEffect">
                                   <p:stCondLst>
                                     <p:cond delay="0"/>
                                   </p:stCondLst>
                                   <p:childTnLst>
                                     <p:set>
                                       <p:cBhvr>
-                                        <p:cTn id="92" dur="1" fill="hold">
+                                        <p:cTn id="140" dur="1" fill="hold">
                                           <p:stCondLst>
                                             <p:cond delay="0"/>
                                           </p:stCondLst>
                                         </p:cTn>
                                         <p:tgtEl>
-                                          <p:spTgt spid="28"/>
+                                          <p:spTgt spid="2072"/>
                                         </p:tgtEl>
                                         <p:attrNameLst>
                                           <p:attrName>style.visibility</p:attrName>
@@ -16563,7 +17728,165 @@
                                     </p:set>
                                     <p:animEffect transition="in" filter="fade">
                                       <p:cBhvr>
-                                        <p:cTn id="93" dur="500"/>
+                                        <p:cTn id="141" dur="500"/>
+                                        <p:tgtEl>
+                                          <p:spTgt spid="2072"/>
+                                        </p:tgtEl>
+                                      </p:cBhvr>
+                                    </p:animEffect>
+                                  </p:childTnLst>
+                                </p:cTn>
+                              </p:par>
+                            </p:childTnLst>
+                          </p:cTn>
+                        </p:par>
+                      </p:childTnLst>
+                    </p:cTn>
+                  </p:par>
+                  <p:par>
+                    <p:cTn id="142" fill="hold">
+                      <p:stCondLst>
+                        <p:cond delay="indefinite"/>
+                      </p:stCondLst>
+                      <p:childTnLst>
+                        <p:par>
+                          <p:cTn id="143" fill="hold">
+                            <p:stCondLst>
+                              <p:cond delay="0"/>
+                            </p:stCondLst>
+                            <p:childTnLst>
+                              <p:par>
+                                <p:cTn id="144" presetID="10" presetClass="entr" presetSubtype="0" fill="hold" grpId="0" nodeType="clickEffect">
+                                  <p:stCondLst>
+                                    <p:cond delay="0"/>
+                                  </p:stCondLst>
+                                  <p:childTnLst>
+                                    <p:set>
+                                      <p:cBhvr>
+                                        <p:cTn id="145" dur="1" fill="hold">
+                                          <p:stCondLst>
+                                            <p:cond delay="0"/>
+                                          </p:stCondLst>
+                                        </p:cTn>
+                                        <p:tgtEl>
+                                          <p:spTgt spid="25"/>
+                                        </p:tgtEl>
+                                        <p:attrNameLst>
+                                          <p:attrName>style.visibility</p:attrName>
+                                        </p:attrNameLst>
+                                      </p:cBhvr>
+                                      <p:to>
+                                        <p:strVal val="visible"/>
+                                      </p:to>
+                                    </p:set>
+                                    <p:animEffect transition="in" filter="fade">
+                                      <p:cBhvr>
+                                        <p:cTn id="146" dur="500"/>
+                                        <p:tgtEl>
+                                          <p:spTgt spid="25"/>
+                                        </p:tgtEl>
+                                      </p:cBhvr>
+                                    </p:animEffect>
+                                  </p:childTnLst>
+                                </p:cTn>
+                              </p:par>
+                              <p:par>
+                                <p:cTn id="147" presetID="10" presetClass="entr" presetSubtype="0" fill="hold" nodeType="withEffect">
+                                  <p:stCondLst>
+                                    <p:cond delay="0"/>
+                                  </p:stCondLst>
+                                  <p:childTnLst>
+                                    <p:set>
+                                      <p:cBhvr>
+                                        <p:cTn id="148" dur="1" fill="hold">
+                                          <p:stCondLst>
+                                            <p:cond delay="0"/>
+                                          </p:stCondLst>
+                                        </p:cTn>
+                                        <p:tgtEl>
+                                          <p:spTgt spid="2074"/>
+                                        </p:tgtEl>
+                                        <p:attrNameLst>
+                                          <p:attrName>style.visibility</p:attrName>
+                                        </p:attrNameLst>
+                                      </p:cBhvr>
+                                      <p:to>
+                                        <p:strVal val="visible"/>
+                                      </p:to>
+                                    </p:set>
+                                    <p:animEffect transition="in" filter="fade">
+                                      <p:cBhvr>
+                                        <p:cTn id="149" dur="500"/>
+                                        <p:tgtEl>
+                                          <p:spTgt spid="2074"/>
+                                        </p:tgtEl>
+                                      </p:cBhvr>
+                                    </p:animEffect>
+                                  </p:childTnLst>
+                                </p:cTn>
+                              </p:par>
+                              <p:par>
+                                <p:cTn id="150" presetID="10" presetClass="entr" presetSubtype="0" fill="hold" nodeType="withEffect">
+                                  <p:stCondLst>
+                                    <p:cond delay="0"/>
+                                  </p:stCondLst>
+                                  <p:childTnLst>
+                                    <p:set>
+                                      <p:cBhvr>
+                                        <p:cTn id="151" dur="1" fill="hold">
+                                          <p:stCondLst>
+                                            <p:cond delay="0"/>
+                                          </p:stCondLst>
+                                        </p:cTn>
+                                        <p:tgtEl>
+                                          <p:spTgt spid="27"/>
+                                        </p:tgtEl>
+                                        <p:attrNameLst>
+                                          <p:attrName>style.visibility</p:attrName>
+                                        </p:attrNameLst>
+                                      </p:cBhvr>
+                                      <p:to>
+                                        <p:strVal val="visible"/>
+                                      </p:to>
+                                    </p:set>
+                                    <p:animEffect transition="in" filter="fade">
+                                      <p:cBhvr>
+                                        <p:cTn id="152" dur="500"/>
+                                        <p:tgtEl>
+                                          <p:spTgt spid="27"/>
+                                        </p:tgtEl>
+                                      </p:cBhvr>
+                                    </p:animEffect>
+                                  </p:childTnLst>
+                                </p:cTn>
+                              </p:par>
+                              <p:par>
+                                <p:cTn id="153" presetID="10" presetClass="entr" presetSubtype="0" fill="hold" grpId="0" nodeType="withEffect">
+                                  <p:stCondLst>
+                                    <p:cond delay="0"/>
+                                  </p:stCondLst>
+                                  <p:childTnLst>
+                                    <p:set>
+                                      <p:cBhvr>
+                                        <p:cTn id="154" dur="1" fill="hold">
+                                          <p:stCondLst>
+                                            <p:cond delay="0"/>
+                                          </p:stCondLst>
+                                        </p:cTn>
+                                        <p:tgtEl>
+                                          <p:spTgt spid="28"/>
+                                        </p:tgtEl>
+                                        <p:attrNameLst>
+                                          <p:attrName>style.visibility</p:attrName>
+                                        </p:attrNameLst>
+                                      </p:cBhvr>
+                                      <p:to>
+                                        <p:strVal val="visible"/>
+                                      </p:to>
+                                    </p:set>
+                                    <p:animEffect transition="in" filter="fade">
+                                      <p:cBhvr>
+                                        <p:cTn id="155" dur="500"/>
                                         <p:tgtEl>
                                           <p:spTgt spid="28"/>
                                         </p:tgtEl>
@@ -16604,17 +17927,27 @@
       <p:bldP spid="8" grpId="1" animBg="1"/>
       <p:bldP spid="9" grpId="0"/>
       <p:bldP spid="9" grpId="1"/>
-      <p:bldP spid="12" grpId="0"/>
-      <p:bldP spid="12" grpId="1"/>
-      <p:bldP spid="13" grpId="0"/>
-      <p:bldP spid="13" grpId="1"/>
       <p:bldP spid="16" grpId="0"/>
       <p:bldP spid="19" grpId="0"/>
-      <p:bldP spid="22" grpId="0"/>
       <p:bldP spid="25" grpId="0"/>
       <p:bldP spid="28" grpId="0" animBg="1"/>
       <p:bldP spid="26" grpId="0"/>
       <p:bldP spid="26" grpId="1"/>
+      <p:bldP spid="5" grpId="0"/>
+      <p:bldP spid="5" grpId="1"/>
+      <p:bldP spid="14" grpId="0"/>
+      <p:bldP spid="14" grpId="1"/>
+      <p:bldP spid="29" grpId="0"/>
+      <p:bldP spid="29" grpId="1"/>
+      <p:bldP spid="2053" grpId="0"/>
+      <p:bldP spid="2053" grpId="1"/>
+      <p:bldP spid="2056" grpId="0"/>
+      <p:bldP spid="2056" grpId="1"/>
+      <p:bldP spid="2059" grpId="0"/>
+      <p:bldP spid="2062" grpId="0"/>
+      <p:bldP spid="2065" grpId="0"/>
+      <p:bldP spid="2069" grpId="0"/>
+      <p:bldP spid="2072" grpId="0"/>
     </p:bldLst>
   </p:timing>
 </p:sld>

</xml_diff>